<commit_message>
New version of the UUID explanation
</commit_message>
<xml_diff>
--- a/06_ohjelmistoarkkitehtuurit_ja_patternit/uuid.pptx
+++ b/06_ohjelmistoarkkitehtuurit_ja_patternit/uuid.pptx
@@ -1195,7 +1195,7 @@
           <a:p>
             <a:fld id="{5645C365-1C26-6946-87AF-75D6A7DF4277}" type="datetimeFigureOut">
               <a:rPr lang="en-GB" smtClean="0"/>
-              <a:t>27/10/2022</a:t>
+              <a:t>30/10/2022</a:t>
             </a:fld>
             <a:endParaRPr lang="en-GB"/>
           </a:p>
@@ -1694,7 +1694,7 @@
           <a:p>
             <a:fld id="{35B864B8-8D08-7B43-B4FB-B2FB41A5D9E3}" type="datetime1">
               <a:rPr lang="fi-FI" smtClean="0"/>
-              <a:t>27.10.2022</a:t>
+              <a:t>30.10.2022</a:t>
             </a:fld>
             <a:endParaRPr lang="en-GB" dirty="0"/>
           </a:p>
@@ -2021,7 +2021,7 @@
           <a:p>
             <a:fld id="{D5AEA85A-FC56-D34C-9AA6-ECC3D2586F37}" type="datetime1">
               <a:rPr lang="fi-FI" smtClean="0"/>
-              <a:t>27.10.2022</a:t>
+              <a:t>30.10.2022</a:t>
             </a:fld>
             <a:endParaRPr lang="en-GB" dirty="0"/>
           </a:p>
@@ -2231,7 +2231,7 @@
           <a:p>
             <a:fld id="{E6BC6EEF-E660-7844-8930-418AFF95EA40}" type="datetime1">
               <a:rPr lang="fi-FI" smtClean="0"/>
-              <a:t>27.10.2022</a:t>
+              <a:t>30.10.2022</a:t>
             </a:fld>
             <a:endParaRPr lang="en-GB" dirty="0"/>
           </a:p>
@@ -2540,7 +2540,7 @@
           <a:p>
             <a:fld id="{4E10C7EC-C1C1-9849-A573-7692478FCD52}" type="datetime1">
               <a:rPr lang="fi-FI" smtClean="0"/>
-              <a:t>27.10.2022</a:t>
+              <a:t>30.10.2022</a:t>
             </a:fld>
             <a:endParaRPr lang="en-GB" dirty="0"/>
           </a:p>
@@ -2813,7 +2813,7 @@
           <a:p>
             <a:fld id="{844FF3FE-30BE-2040-9151-6FBC4992BF4F}" type="datetime1">
               <a:rPr lang="fi-FI" smtClean="0"/>
-              <a:t>27.10.2022</a:t>
+              <a:t>30.10.2022</a:t>
             </a:fld>
             <a:endParaRPr lang="en-GB" dirty="0"/>
           </a:p>
@@ -3053,7 +3053,7 @@
           <a:p>
             <a:fld id="{11EDCD7B-6966-E249-89F2-D46BDFBF56BE}" type="datetime1">
               <a:rPr lang="fi-FI" smtClean="0"/>
-              <a:t>27.10.2022</a:t>
+              <a:t>30.10.2022</a:t>
             </a:fld>
             <a:endParaRPr lang="en-GB" dirty="0"/>
           </a:p>
@@ -3346,7 +3346,7 @@
           <a:p>
             <a:fld id="{11EDCD7B-6966-E249-89F2-D46BDFBF56BE}" type="datetime1">
               <a:rPr lang="fi-FI" smtClean="0"/>
-              <a:t>27.10.2022</a:t>
+              <a:t>30.10.2022</a:t>
             </a:fld>
             <a:endParaRPr lang="en-GB" dirty="0"/>
           </a:p>
@@ -3785,7 +3785,7 @@
           <a:p>
             <a:fld id="{844FF3FE-30BE-2040-9151-6FBC4992BF4F}" type="datetime1">
               <a:rPr lang="fi-FI" smtClean="0"/>
-              <a:t>27.10.2022</a:t>
+              <a:t>30.10.2022</a:t>
             </a:fld>
             <a:endParaRPr lang="en-GB" dirty="0"/>
           </a:p>
@@ -4013,7 +4013,7 @@
           <a:p>
             <a:fld id="{11EDCD7B-6966-E249-89F2-D46BDFBF56BE}" type="datetime1">
               <a:rPr lang="fi-FI" smtClean="0"/>
-              <a:t>27.10.2022</a:t>
+              <a:t>30.10.2022</a:t>
             </a:fld>
             <a:endParaRPr lang="en-GB" dirty="0"/>
           </a:p>
@@ -4428,7 +4428,7 @@
           <a:p>
             <a:fld id="{B62E192A-D52B-F541-B2AA-4AEB9388F1F7}" type="datetime1">
               <a:rPr lang="fi-FI" smtClean="0"/>
-              <a:t>27.10.2022</a:t>
+              <a:t>30.10.2022</a:t>
             </a:fld>
             <a:endParaRPr lang="en-GB" dirty="0"/>
           </a:p>
@@ -4728,7 +4728,7 @@
           <a:p>
             <a:fld id="{EEA4FAA2-2B3E-264C-A42F-2D6D3EF33A3C}" type="datetime1">
               <a:rPr lang="fi-FI" smtClean="0"/>
-              <a:t>27.10.2022</a:t>
+              <a:t>30.10.2022</a:t>
             </a:fld>
             <a:endParaRPr lang="en-GB" dirty="0"/>
           </a:p>
@@ -5631,7 +5631,7 @@
           <a:p>
             <a:fld id="{B3114A65-8017-1743-A85A-B2A4BB835AE9}" type="datetime1">
               <a:rPr lang="fi-FI" smtClean="0"/>
-              <a:t>27.10.2022</a:t>
+              <a:t>30.10.2022</a:t>
             </a:fld>
             <a:endParaRPr lang="en-GB" dirty="0"/>
           </a:p>
@@ -5859,7 +5859,7 @@
           <a:p>
             <a:fld id="{11EDCD7B-6966-E249-89F2-D46BDFBF56BE}" type="datetime1">
               <a:rPr lang="fi-FI" smtClean="0"/>
-              <a:t>27.10.2022</a:t>
+              <a:t>30.10.2022</a:t>
             </a:fld>
             <a:endParaRPr lang="en-GB" dirty="0"/>
           </a:p>
@@ -6151,7 +6151,7 @@
           <a:p>
             <a:fld id="{45F98643-D206-614D-B596-3C8548138211}" type="datetime1">
               <a:rPr lang="fi-FI" smtClean="0"/>
-              <a:t>27.10.2022</a:t>
+              <a:t>30.10.2022</a:t>
             </a:fld>
             <a:endParaRPr lang="en-GB" dirty="0"/>
           </a:p>
@@ -6799,7 +6799,7 @@
           <a:p>
             <a:fld id="{30BF63A1-919F-FB49-ABA8-182126D24C50}" type="datetime1">
               <a:rPr lang="fi-FI" smtClean="0"/>
-              <a:t>27.10.2022</a:t>
+              <a:t>30.10.2022</a:t>
             </a:fld>
             <a:endParaRPr lang="en-GB" dirty="0"/>
           </a:p>
@@ -6951,7 +6951,7 @@
             </a:r>
             <a:r>
               <a:rPr lang="fi-FI" dirty="0"/>
-              <a:t>/MySQL: AUTOINCREMENT, Oracle: </a:t>
+              <a:t>/MySQL: AUTO_INCREMENT, Oracle: </a:t>
             </a:r>
             <a:r>
               <a:rPr lang="fi-FI" dirty="0" err="1"/>
@@ -6959,7 +6959,23 @@
             </a:r>
             <a:r>
               <a:rPr lang="fi-FI" dirty="0"/>
-              <a:t>, MS SQL Server: Identity, etc. etc.</a:t>
+              <a:t>, MS SQL Server: Identity (1001,1)  </a:t>
+            </a:r>
+            <a:r>
+              <a:rPr lang="fi-FI" dirty="0" err="1"/>
+              <a:t>etc</a:t>
+            </a:r>
+            <a:r>
+              <a:rPr lang="fi-FI" dirty="0"/>
+              <a:t>… </a:t>
+            </a:r>
+            <a:r>
+              <a:rPr lang="fi-FI" dirty="0" err="1"/>
+              <a:t>etc</a:t>
+            </a:r>
+            <a:r>
+              <a:rPr lang="fi-FI" dirty="0"/>
+              <a:t>…</a:t>
             </a:r>
             <a:endParaRPr lang="fi-FI" sz="1100" dirty="0"/>
           </a:p>
@@ -7003,6 +7019,224 @@
             </a:r>
             <a:r>
               <a:rPr lang="fi-FI" dirty="0" err="1"/>
+              <a:t>who</a:t>
+            </a:r>
+            <a:r>
+              <a:rPr lang="fi-FI" dirty="0"/>
+              <a:t> </a:t>
+            </a:r>
+            <a:r>
+              <a:rPr lang="fi-FI" dirty="0" err="1"/>
+              <a:t>creates</a:t>
+            </a:r>
+            <a:r>
+              <a:rPr lang="fi-FI" dirty="0"/>
+              <a:t> </a:t>
+            </a:r>
+            <a:r>
+              <a:rPr lang="fi-FI" dirty="0" err="1"/>
+              <a:t>the</a:t>
+            </a:r>
+            <a:r>
+              <a:rPr lang="fi-FI" dirty="0"/>
+              <a:t> </a:t>
+            </a:r>
+            <a:r>
+              <a:rPr lang="fi-FI" dirty="0" err="1"/>
+              <a:t>id:s</a:t>
+            </a:r>
+            <a:endParaRPr lang="fi-FI" dirty="0"/>
+          </a:p>
+          <a:p>
+            <a:pPr lvl="0"/>
+            <a:r>
+              <a:rPr lang="fi-FI" dirty="0" err="1"/>
+              <a:t>Challenges</a:t>
+            </a:r>
+            <a:r>
+              <a:rPr lang="fi-FI" dirty="0"/>
+              <a:t>:</a:t>
+            </a:r>
+          </a:p>
+          <a:p>
+            <a:pPr lvl="1"/>
+            <a:r>
+              <a:rPr lang="fi-FI" dirty="0"/>
+              <a:t>If </a:t>
+            </a:r>
+            <a:r>
+              <a:rPr lang="fi-FI" dirty="0" err="1"/>
+              <a:t>database</a:t>
+            </a:r>
+            <a:r>
+              <a:rPr lang="fi-FI" dirty="0"/>
+              <a:t> is a </a:t>
+            </a:r>
+            <a:r>
+              <a:rPr lang="fi-FI" dirty="0" err="1"/>
+              <a:t>distributed</a:t>
+            </a:r>
+            <a:r>
+              <a:rPr lang="fi-FI" dirty="0"/>
+              <a:t> </a:t>
+            </a:r>
+            <a:r>
+              <a:rPr lang="fi-FI" dirty="0" err="1"/>
+              <a:t>database</a:t>
+            </a:r>
+            <a:r>
+              <a:rPr lang="fi-FI" dirty="0"/>
+              <a:t>, </a:t>
+            </a:r>
+            <a:r>
+              <a:rPr lang="fi-FI" dirty="0" err="1"/>
+              <a:t>how</a:t>
+            </a:r>
+            <a:r>
+              <a:rPr lang="fi-FI" dirty="0"/>
+              <a:t> to </a:t>
+            </a:r>
+            <a:r>
+              <a:rPr lang="fi-FI" dirty="0" err="1"/>
+              <a:t>make</a:t>
+            </a:r>
+            <a:r>
+              <a:rPr lang="fi-FI" dirty="0"/>
+              <a:t> sure </a:t>
+            </a:r>
+            <a:r>
+              <a:rPr lang="fi-FI" dirty="0" err="1"/>
+              <a:t>each</a:t>
+            </a:r>
+            <a:r>
+              <a:rPr lang="fi-FI" dirty="0"/>
+              <a:t> </a:t>
+            </a:r>
+            <a:r>
+              <a:rPr lang="fi-FI" dirty="0" err="1"/>
+              <a:t>item</a:t>
+            </a:r>
+            <a:r>
+              <a:rPr lang="fi-FI" dirty="0"/>
+              <a:t> </a:t>
+            </a:r>
+            <a:r>
+              <a:rPr lang="fi-FI" dirty="0" err="1"/>
+              <a:t>will</a:t>
+            </a:r>
+            <a:r>
+              <a:rPr lang="fi-FI" dirty="0"/>
+              <a:t> </a:t>
+            </a:r>
+            <a:r>
+              <a:rPr lang="fi-FI" dirty="0" err="1"/>
+              <a:t>get</a:t>
+            </a:r>
+            <a:r>
+              <a:rPr lang="fi-FI" dirty="0"/>
+              <a:t> a </a:t>
+            </a:r>
+            <a:r>
+              <a:rPr lang="fi-FI" dirty="0" err="1"/>
+              <a:t>unique</a:t>
+            </a:r>
+            <a:r>
+              <a:rPr lang="fi-FI" dirty="0"/>
+              <a:t> id?</a:t>
+            </a:r>
+          </a:p>
+          <a:p>
+            <a:pPr lvl="1"/>
+            <a:r>
+              <a:rPr lang="fi-FI" dirty="0" err="1"/>
+              <a:t>When</a:t>
+            </a:r>
+            <a:r>
+              <a:rPr lang="fi-FI" dirty="0"/>
+              <a:t> </a:t>
+            </a:r>
+            <a:r>
+              <a:rPr lang="fi-FI" dirty="0" err="1"/>
+              <a:t>database</a:t>
+            </a:r>
+            <a:r>
+              <a:rPr lang="fi-FI" dirty="0"/>
+              <a:t> </a:t>
+            </a:r>
+            <a:r>
+              <a:rPr lang="fi-FI" dirty="0" err="1"/>
+              <a:t>creates</a:t>
+            </a:r>
+            <a:r>
+              <a:rPr lang="fi-FI" dirty="0"/>
+              <a:t> </a:t>
+            </a:r>
+            <a:r>
+              <a:rPr lang="fi-FI" dirty="0" err="1"/>
+              <a:t>the</a:t>
+            </a:r>
+            <a:r>
+              <a:rPr lang="fi-FI" dirty="0"/>
+              <a:t> </a:t>
+            </a:r>
+            <a:r>
+              <a:rPr lang="fi-FI" dirty="0" err="1"/>
+              <a:t>id:s</a:t>
+            </a:r>
+            <a:r>
+              <a:rPr lang="fi-FI" dirty="0"/>
+              <a:t>, </a:t>
+            </a:r>
+            <a:r>
+              <a:rPr lang="fi-FI" dirty="0" err="1"/>
+              <a:t>how</a:t>
+            </a:r>
+            <a:r>
+              <a:rPr lang="fi-FI" dirty="0"/>
+              <a:t> to </a:t>
+            </a:r>
+            <a:r>
+              <a:rPr lang="fi-FI" dirty="0" err="1"/>
+              <a:t>get</a:t>
+            </a:r>
+            <a:r>
+              <a:rPr lang="fi-FI" dirty="0"/>
+              <a:t> a </a:t>
+            </a:r>
+            <a:r>
+              <a:rPr lang="fi-FI" dirty="0" err="1"/>
+              <a:t>correct</a:t>
+            </a:r>
+            <a:r>
+              <a:rPr lang="fi-FI" dirty="0"/>
+              <a:t> id </a:t>
+            </a:r>
+            <a:r>
+              <a:rPr lang="fi-FI" dirty="0" err="1"/>
+              <a:t>back</a:t>
+            </a:r>
+            <a:r>
+              <a:rPr lang="fi-FI" dirty="0"/>
+              <a:t> to </a:t>
+            </a:r>
+            <a:r>
+              <a:rPr lang="fi-FI" dirty="0" err="1"/>
+              <a:t>the</a:t>
+            </a:r>
+            <a:r>
+              <a:rPr lang="fi-FI" dirty="0"/>
+              <a:t> </a:t>
+            </a:r>
+            <a:r>
+              <a:rPr lang="fi-FI" dirty="0" err="1"/>
+              <a:t>frontend</a:t>
+            </a:r>
+            <a:r>
+              <a:rPr lang="fi-FI" dirty="0"/>
+              <a:t> </a:t>
+            </a:r>
+            <a:r>
+              <a:rPr lang="fi-FI" dirty="0" err="1"/>
               <a:t>that</a:t>
             </a:r>
             <a:r>
@@ -7011,7 +7245,7 @@
             </a:r>
             <a:r>
               <a:rPr lang="fi-FI" dirty="0" err="1"/>
-              <a:t>creates</a:t>
+              <a:t>initiated</a:t>
             </a:r>
             <a:r>
               <a:rPr lang="fi-FI" dirty="0"/>
@@ -7027,26 +7261,322 @@
             </a:r>
             <a:r>
               <a:rPr lang="fi-FI" dirty="0" err="1"/>
-              <a:t>id:s</a:t>
+              <a:t>creation</a:t>
+            </a:r>
+            <a:r>
+              <a:rPr lang="fi-FI" dirty="0"/>
+              <a:t> of </a:t>
+            </a:r>
+            <a:r>
+              <a:rPr lang="fi-FI" dirty="0" err="1"/>
+              <a:t>that</a:t>
+            </a:r>
+            <a:r>
+              <a:rPr lang="fi-FI" dirty="0"/>
+              <a:t> </a:t>
+            </a:r>
+            <a:r>
+              <a:rPr lang="fi-FI" dirty="0" err="1"/>
+              <a:t>new</a:t>
+            </a:r>
+            <a:r>
+              <a:rPr lang="fi-FI" dirty="0"/>
+              <a:t> </a:t>
+            </a:r>
+            <a:r>
+              <a:rPr lang="fi-FI" dirty="0" err="1"/>
+              <a:t>resource</a:t>
+            </a:r>
+            <a:r>
+              <a:rPr lang="fi-FI" dirty="0"/>
+              <a:t> / </a:t>
+            </a:r>
+            <a:r>
+              <a:rPr lang="fi-FI" dirty="0" err="1"/>
+              <a:t>object</a:t>
+            </a:r>
+            <a:r>
+              <a:rPr lang="fi-FI" dirty="0"/>
+              <a:t>?</a:t>
+            </a:r>
+          </a:p>
+          <a:p>
+            <a:pPr lvl="2"/>
+            <a:r>
+              <a:rPr lang="fi-FI" dirty="0" err="1"/>
+              <a:t>E.g</a:t>
+            </a:r>
+            <a:r>
+              <a:rPr lang="fi-FI" dirty="0"/>
+              <a:t>. </a:t>
+            </a:r>
+            <a:r>
+              <a:rPr lang="fi-FI" dirty="0" err="1"/>
+              <a:t>the</a:t>
+            </a:r>
+            <a:r>
+              <a:rPr lang="fi-FI" dirty="0"/>
+              <a:t> </a:t>
+            </a:r>
+            <a:r>
+              <a:rPr lang="fi-FI" dirty="0" err="1"/>
+              <a:t>Knex</a:t>
+            </a:r>
+            <a:r>
+              <a:rPr lang="fi-FI" dirty="0"/>
+              <a:t> </a:t>
+            </a:r>
+            <a:r>
+              <a:rPr lang="fi-FI" dirty="0" err="1"/>
+              <a:t>library</a:t>
+            </a:r>
+            <a:r>
+              <a:rPr lang="fi-FI" dirty="0"/>
+              <a:t> </a:t>
+            </a:r>
+            <a:r>
+              <a:rPr lang="fi-FI" dirty="0" err="1"/>
+              <a:t>returns</a:t>
+            </a:r>
+            <a:r>
+              <a:rPr lang="fi-FI" dirty="0"/>
+              <a:t> an </a:t>
+            </a:r>
+            <a:r>
+              <a:rPr lang="fi-FI" dirty="0" err="1"/>
+              <a:t>array</a:t>
+            </a:r>
+            <a:r>
+              <a:rPr lang="fi-FI" dirty="0"/>
+              <a:t> of </a:t>
+            </a:r>
+            <a:r>
+              <a:rPr lang="fi-FI" dirty="0" err="1"/>
+              <a:t>newly</a:t>
+            </a:r>
+            <a:r>
+              <a:rPr lang="fi-FI" dirty="0"/>
+              <a:t> </a:t>
+            </a:r>
+            <a:r>
+              <a:rPr lang="fi-FI" dirty="0" err="1"/>
+              <a:t>created</a:t>
+            </a:r>
+            <a:r>
+              <a:rPr lang="fi-FI" dirty="0"/>
+              <a:t> </a:t>
+            </a:r>
+            <a:r>
+              <a:rPr lang="fi-FI" dirty="0" err="1"/>
+              <a:t>database</a:t>
+            </a:r>
+            <a:r>
+              <a:rPr lang="fi-FI" dirty="0"/>
+              <a:t> </a:t>
+            </a:r>
+            <a:r>
+              <a:rPr lang="fi-FI" dirty="0" err="1"/>
+              <a:t>row</a:t>
+            </a:r>
+            <a:r>
+              <a:rPr lang="fi-FI" dirty="0"/>
+              <a:t> </a:t>
+            </a:r>
+            <a:r>
+              <a:rPr lang="fi-FI" dirty="0" err="1"/>
+              <a:t>primary</a:t>
+            </a:r>
+            <a:r>
+              <a:rPr lang="fi-FI" dirty="0"/>
+              <a:t> </a:t>
+            </a:r>
+            <a:r>
+              <a:rPr lang="fi-FI" dirty="0" err="1"/>
+              <a:t>key</a:t>
+            </a:r>
+            <a:r>
+              <a:rPr lang="fi-FI" dirty="0"/>
+              <a:t>(s) </a:t>
+            </a:r>
+            <a:r>
+              <a:rPr lang="fi-FI" dirty="0" err="1"/>
+              <a:t>if</a:t>
+            </a:r>
+            <a:r>
+              <a:rPr lang="fi-FI" dirty="0"/>
+              <a:t> </a:t>
+            </a:r>
+            <a:r>
+              <a:rPr lang="fi-FI" dirty="0" err="1"/>
+              <a:t>creation</a:t>
+            </a:r>
+            <a:r>
+              <a:rPr lang="fi-FI" dirty="0"/>
+              <a:t> </a:t>
+            </a:r>
+            <a:r>
+              <a:rPr lang="fi-FI" dirty="0" err="1"/>
+              <a:t>was</a:t>
+            </a:r>
+            <a:r>
+              <a:rPr lang="fi-FI" dirty="0"/>
+              <a:t> </a:t>
+            </a:r>
+            <a:r>
+              <a:rPr lang="fi-FI" dirty="0" err="1"/>
+              <a:t>successful</a:t>
             </a:r>
             <a:endParaRPr lang="fi-FI" dirty="0"/>
           </a:p>
           <a:p>
-            <a:pPr lvl="0"/>
-            <a:r>
-              <a:rPr lang="fi-FI" dirty="0" err="1"/>
-              <a:t>Challenges</a:t>
-            </a:r>
-            <a:r>
-              <a:rPr lang="fi-FI" dirty="0"/>
-              <a:t>:</a:t>
-            </a:r>
+            <a:pPr lvl="2"/>
+            <a:r>
+              <a:rPr lang="fi-FI" dirty="0"/>
+              <a:t>=&gt; Return </a:t>
+            </a:r>
+            <a:r>
+              <a:rPr lang="fi-FI" dirty="0" err="1"/>
+              <a:t>that</a:t>
+            </a:r>
+            <a:r>
+              <a:rPr lang="fi-FI" dirty="0"/>
+              <a:t> to </a:t>
+            </a:r>
+            <a:r>
+              <a:rPr lang="fi-FI" dirty="0" err="1"/>
+              <a:t>the</a:t>
+            </a:r>
+            <a:r>
+              <a:rPr lang="fi-FI" dirty="0"/>
+              <a:t> </a:t>
+            </a:r>
+            <a:r>
+              <a:rPr lang="fi-FI" dirty="0" err="1"/>
+              <a:t>frontend</a:t>
+            </a:r>
+            <a:r>
+              <a:rPr lang="fi-FI" dirty="0"/>
+              <a:t> </a:t>
+            </a:r>
+            <a:r>
+              <a:rPr lang="fi-FI" dirty="0" err="1"/>
+              <a:t>too</a:t>
+            </a:r>
+            <a:r>
+              <a:rPr lang="fi-FI" dirty="0"/>
+              <a:t>, </a:t>
+            </a:r>
+            <a:r>
+              <a:rPr lang="fi-FI" dirty="0" err="1"/>
+              <a:t>e.g</a:t>
+            </a:r>
+            <a:r>
+              <a:rPr lang="fi-FI" dirty="0"/>
+              <a:t>. in an </a:t>
+            </a:r>
+            <a:r>
+              <a:rPr lang="fi-FI" dirty="0" err="1"/>
+              <a:t>object</a:t>
+            </a:r>
+            <a:r>
+              <a:rPr lang="fi-FI" dirty="0"/>
+              <a:t> as JSON in </a:t>
+            </a:r>
+            <a:r>
+              <a:rPr lang="fi-FI" dirty="0" err="1"/>
+              <a:t>body</a:t>
+            </a:r>
+            <a:r>
+              <a:rPr lang="fi-FI" dirty="0"/>
+              <a:t> of </a:t>
+            </a:r>
+            <a:r>
+              <a:rPr lang="fi-FI" dirty="0" err="1"/>
+              <a:t>the</a:t>
+            </a:r>
+            <a:r>
+              <a:rPr lang="fi-FI" dirty="0"/>
+              <a:t> http </a:t>
+            </a:r>
+            <a:r>
+              <a:rPr lang="fi-FI" dirty="0" err="1"/>
+              <a:t>response</a:t>
+            </a:r>
+            <a:endParaRPr lang="fi-FI" dirty="0"/>
           </a:p>
           <a:p>
             <a:pPr lvl="1"/>
             <a:r>
-              <a:rPr lang="fi-FI" dirty="0"/>
-              <a:t>If </a:t>
+              <a:rPr lang="fi-FI" dirty="0" err="1"/>
+              <a:t>What</a:t>
+            </a:r>
+            <a:r>
+              <a:rPr lang="fi-FI" dirty="0"/>
+              <a:t> </a:t>
+            </a:r>
+            <a:r>
+              <a:rPr lang="fi-FI" dirty="0" err="1"/>
+              <a:t>if</a:t>
+            </a:r>
+            <a:r>
+              <a:rPr lang="fi-FI" dirty="0"/>
+              <a:t> </a:t>
+            </a:r>
+            <a:r>
+              <a:rPr lang="fi-FI" dirty="0" err="1"/>
+              <a:t>we</a:t>
+            </a:r>
+            <a:r>
+              <a:rPr lang="fi-FI" dirty="0"/>
+              <a:t> </a:t>
+            </a:r>
+            <a:r>
+              <a:rPr lang="fi-FI" dirty="0" err="1"/>
+              <a:t>have</a:t>
+            </a:r>
+            <a:r>
+              <a:rPr lang="fi-FI" dirty="0"/>
+              <a:t> a </a:t>
+            </a:r>
+            <a:r>
+              <a:rPr lang="fi-FI" dirty="0" err="1"/>
+              <a:t>totally</a:t>
+            </a:r>
+            <a:r>
+              <a:rPr lang="fi-FI" dirty="0"/>
+              <a:t> </a:t>
+            </a:r>
+            <a:r>
+              <a:rPr lang="fi-FI" dirty="0" err="1"/>
+              <a:t>distributed</a:t>
+            </a:r>
+            <a:r>
+              <a:rPr lang="fi-FI" dirty="0"/>
+              <a:t> </a:t>
+            </a:r>
+            <a:r>
+              <a:rPr lang="fi-FI" dirty="0" err="1"/>
+              <a:t>architecture</a:t>
+            </a:r>
+            <a:r>
+              <a:rPr lang="fi-FI" dirty="0"/>
+              <a:t> and </a:t>
+            </a:r>
+            <a:r>
+              <a:rPr lang="fi-FI" dirty="0" err="1"/>
+              <a:t>there</a:t>
+            </a:r>
+            <a:r>
+              <a:rPr lang="fi-FI" dirty="0"/>
+              <a:t> is no </a:t>
+            </a:r>
+            <a:r>
+              <a:rPr lang="fi-FI" dirty="0" err="1"/>
+              <a:t>certain</a:t>
+            </a:r>
+            <a:r>
+              <a:rPr lang="fi-FI" dirty="0"/>
+              <a:t> </a:t>
             </a:r>
             <a:r>
               <a:rPr lang="fi-FI" dirty="0" err="1"/>
@@ -7054,19 +7584,139 @@
             </a:r>
             <a:r>
               <a:rPr lang="fi-FI" dirty="0"/>
-              <a:t> is </a:t>
-            </a:r>
-            <a:r>
-              <a:rPr lang="fi-FI" dirty="0" err="1"/>
-              <a:t>distributed</a:t>
-            </a:r>
-            <a:r>
-              <a:rPr lang="fi-FI" dirty="0"/>
-              <a:t>, </a:t>
-            </a:r>
-            <a:r>
-              <a:rPr lang="fi-FI" dirty="0" err="1"/>
-              <a:t>how</a:t>
+              <a:t>? </a:t>
+            </a:r>
+            <a:r>
+              <a:rPr lang="fi-FI" dirty="0" err="1"/>
+              <a:t>Or</a:t>
+            </a:r>
+            <a:r>
+              <a:rPr lang="fi-FI" dirty="0"/>
+              <a:t> </a:t>
+            </a:r>
+            <a:r>
+              <a:rPr lang="fi-FI" dirty="0" err="1"/>
+              <a:t>we</a:t>
+            </a:r>
+            <a:r>
+              <a:rPr lang="fi-FI" dirty="0"/>
+              <a:t> </a:t>
+            </a:r>
+            <a:r>
+              <a:rPr lang="fi-FI" dirty="0" err="1"/>
+              <a:t>have</a:t>
+            </a:r>
+            <a:r>
+              <a:rPr lang="fi-FI" dirty="0"/>
+              <a:t> an </a:t>
+            </a:r>
+            <a:r>
+              <a:rPr lang="fi-FI" dirty="0" err="1"/>
+              <a:t>IoT</a:t>
+            </a:r>
+            <a:r>
+              <a:rPr lang="fi-FI" dirty="0"/>
+              <a:t> </a:t>
+            </a:r>
+            <a:r>
+              <a:rPr lang="fi-FI" dirty="0" err="1"/>
+              <a:t>system</a:t>
+            </a:r>
+            <a:r>
+              <a:rPr lang="fi-FI" dirty="0"/>
+              <a:t> </a:t>
+            </a:r>
+            <a:r>
+              <a:rPr lang="fi-FI" dirty="0" err="1"/>
+              <a:t>where</a:t>
+            </a:r>
+            <a:r>
+              <a:rPr lang="fi-FI" dirty="0"/>
+              <a:t> </a:t>
+            </a:r>
+            <a:r>
+              <a:rPr lang="fi-FI" dirty="0" err="1"/>
+              <a:t>devices</a:t>
+            </a:r>
+            <a:r>
+              <a:rPr lang="fi-FI" dirty="0"/>
+              <a:t> </a:t>
+            </a:r>
+            <a:r>
+              <a:rPr lang="fi-FI" dirty="0" err="1"/>
+              <a:t>are</a:t>
+            </a:r>
+            <a:r>
+              <a:rPr lang="fi-FI" dirty="0"/>
+              <a:t> </a:t>
+            </a:r>
+            <a:r>
+              <a:rPr lang="fi-FI" dirty="0" err="1"/>
+              <a:t>e.g</a:t>
+            </a:r>
+            <a:r>
+              <a:rPr lang="fi-FI" dirty="0"/>
+              <a:t>. </a:t>
+            </a:r>
+            <a:r>
+              <a:rPr lang="fi-FI" dirty="0" err="1"/>
+              <a:t>under</a:t>
+            </a:r>
+            <a:r>
+              <a:rPr lang="fi-FI" dirty="0"/>
+              <a:t> </a:t>
+            </a:r>
+            <a:r>
+              <a:rPr lang="fi-FI" dirty="0" err="1"/>
+              <a:t>water</a:t>
+            </a:r>
+            <a:r>
+              <a:rPr lang="fi-FI" dirty="0"/>
+              <a:t> and </a:t>
+            </a:r>
+            <a:r>
+              <a:rPr lang="fi-FI" dirty="0" err="1"/>
+              <a:t>collect</a:t>
+            </a:r>
+            <a:r>
+              <a:rPr lang="fi-FI" dirty="0"/>
+              <a:t> </a:t>
+            </a:r>
+            <a:r>
+              <a:rPr lang="fi-FI" dirty="0" err="1"/>
+              <a:t>information</a:t>
+            </a:r>
+            <a:r>
+              <a:rPr lang="fi-FI" dirty="0"/>
+              <a:t> and </a:t>
+            </a:r>
+            <a:r>
+              <a:rPr lang="fi-FI" dirty="0" err="1"/>
+              <a:t>events</a:t>
+            </a:r>
+            <a:r>
+              <a:rPr lang="fi-FI" dirty="0"/>
+              <a:t>, and </a:t>
+            </a:r>
+            <a:r>
+              <a:rPr lang="fi-FI" dirty="0" err="1"/>
+              <a:t>they</a:t>
+            </a:r>
+            <a:r>
+              <a:rPr lang="fi-FI" dirty="0"/>
+              <a:t> </a:t>
+            </a:r>
+            <a:r>
+              <a:rPr lang="fi-FI" dirty="0" err="1"/>
+              <a:t>have</a:t>
+            </a:r>
+            <a:r>
+              <a:rPr lang="fi-FI" dirty="0"/>
+              <a:t> </a:t>
+            </a:r>
+            <a:r>
+              <a:rPr lang="fi-FI" dirty="0" err="1"/>
+              <a:t>access</a:t>
             </a:r>
             <a:r>
               <a:rPr lang="fi-FI" dirty="0"/>
@@ -7074,39 +7724,145 @@
             </a:r>
             <a:r>
               <a:rPr lang="fi-FI" dirty="0" err="1"/>
-              <a:t>make</a:t>
-            </a:r>
-            <a:r>
-              <a:rPr lang="fi-FI" dirty="0"/>
-              <a:t> sure </a:t>
-            </a:r>
-            <a:r>
-              <a:rPr lang="fi-FI" dirty="0" err="1"/>
-              <a:t>each</a:t>
-            </a:r>
-            <a:r>
-              <a:rPr lang="fi-FI" dirty="0"/>
-              <a:t> </a:t>
-            </a:r>
-            <a:r>
-              <a:rPr lang="fi-FI" dirty="0" err="1"/>
-              <a:t>item</a:t>
-            </a:r>
-            <a:r>
-              <a:rPr lang="fi-FI" dirty="0"/>
-              <a:t> </a:t>
-            </a:r>
-            <a:r>
-              <a:rPr lang="fi-FI" dirty="0" err="1"/>
-              <a:t>will</a:t>
-            </a:r>
-            <a:r>
-              <a:rPr lang="fi-FI" dirty="0"/>
-              <a:t> </a:t>
-            </a:r>
-            <a:r>
-              <a:rPr lang="fi-FI" dirty="0" err="1"/>
-              <a:t>get</a:t>
+              <a:t>the</a:t>
+            </a:r>
+            <a:r>
+              <a:rPr lang="fi-FI" dirty="0"/>
+              <a:t> </a:t>
+            </a:r>
+            <a:r>
+              <a:rPr lang="fi-FI" dirty="0" err="1"/>
+              <a:t>other</a:t>
+            </a:r>
+            <a:r>
+              <a:rPr lang="fi-FI" dirty="0"/>
+              <a:t> </a:t>
+            </a:r>
+            <a:r>
+              <a:rPr lang="fi-FI" dirty="0" err="1"/>
+              <a:t>parts</a:t>
+            </a:r>
+            <a:r>
+              <a:rPr lang="fi-FI" dirty="0"/>
+              <a:t> of </a:t>
+            </a:r>
+            <a:r>
+              <a:rPr lang="fi-FI" dirty="0" err="1"/>
+              <a:t>the</a:t>
+            </a:r>
+            <a:r>
+              <a:rPr lang="fi-FI" dirty="0"/>
+              <a:t> </a:t>
+            </a:r>
+            <a:r>
+              <a:rPr lang="fi-FI" dirty="0" err="1"/>
+              <a:t>system</a:t>
+            </a:r>
+            <a:r>
+              <a:rPr lang="fi-FI" dirty="0"/>
+              <a:t> </a:t>
+            </a:r>
+            <a:r>
+              <a:rPr lang="fi-FI" dirty="0" err="1"/>
+              <a:t>only</a:t>
+            </a:r>
+            <a:r>
+              <a:rPr lang="fi-FI" dirty="0"/>
+              <a:t> </a:t>
+            </a:r>
+            <a:r>
+              <a:rPr lang="fi-FI" dirty="0" err="1"/>
+              <a:t>occasionally</a:t>
+            </a:r>
+            <a:r>
+              <a:rPr lang="fi-FI" dirty="0"/>
+              <a:t>?</a:t>
+            </a:r>
+          </a:p>
+          <a:p>
+            <a:r>
+              <a:rPr lang="fi-FI" dirty="0" err="1"/>
+              <a:t>Then</a:t>
+            </a:r>
+            <a:r>
+              <a:rPr lang="fi-FI" dirty="0"/>
+              <a:t> </a:t>
+            </a:r>
+            <a:r>
+              <a:rPr lang="fi-FI" dirty="0" err="1"/>
+              <a:t>we</a:t>
+            </a:r>
+            <a:r>
+              <a:rPr lang="fi-FI" dirty="0"/>
+              <a:t> </a:t>
+            </a:r>
+            <a:r>
+              <a:rPr lang="fi-FI" dirty="0" err="1"/>
+              <a:t>start</a:t>
+            </a:r>
+            <a:r>
+              <a:rPr lang="fi-FI" dirty="0"/>
+              <a:t> to </a:t>
+            </a:r>
+            <a:r>
+              <a:rPr lang="fi-FI" dirty="0" err="1"/>
+              <a:t>have</a:t>
+            </a:r>
+            <a:r>
+              <a:rPr lang="fi-FI" dirty="0"/>
+              <a:t> a case for </a:t>
+            </a:r>
+            <a:r>
+              <a:rPr lang="fi-FI" dirty="0" err="1"/>
+              <a:t>system</a:t>
+            </a:r>
+            <a:r>
+              <a:rPr lang="fi-FI" dirty="0"/>
+              <a:t> </a:t>
+            </a:r>
+            <a:r>
+              <a:rPr lang="fi-FI" dirty="0" err="1"/>
+              <a:t>where</a:t>
+            </a:r>
+            <a:r>
+              <a:rPr lang="fi-FI" dirty="0"/>
+              <a:t> _</a:t>
+            </a:r>
+            <a:r>
+              <a:rPr lang="fi-FI" dirty="0" err="1"/>
+              <a:t>everyone</a:t>
+            </a:r>
+            <a:r>
+              <a:rPr lang="fi-FI" dirty="0"/>
+              <a:t>_ </a:t>
+            </a:r>
+            <a:r>
+              <a:rPr lang="fi-FI" dirty="0" err="1"/>
+              <a:t>needs</a:t>
+            </a:r>
+            <a:r>
+              <a:rPr lang="fi-FI" dirty="0"/>
+              <a:t> to </a:t>
+            </a:r>
+            <a:r>
+              <a:rPr lang="fi-FI" dirty="0" err="1"/>
+              <a:t>be</a:t>
+            </a:r>
+            <a:r>
+              <a:rPr lang="fi-FI" dirty="0"/>
+              <a:t> </a:t>
+            </a:r>
+            <a:r>
+              <a:rPr lang="fi-FI" dirty="0" err="1"/>
+              <a:t>able</a:t>
+            </a:r>
+            <a:r>
+              <a:rPr lang="fi-FI" dirty="0"/>
+              <a:t> to </a:t>
+            </a:r>
+            <a:r>
+              <a:rPr lang="fi-FI" dirty="0" err="1"/>
+              <a:t>create</a:t>
             </a:r>
             <a:r>
               <a:rPr lang="fi-FI" dirty="0"/>
@@ -7115,674 +7871,6 @@
             <a:r>
               <a:rPr lang="fi-FI" dirty="0" err="1"/>
               <a:t>unique</a:t>
-            </a:r>
-            <a:r>
-              <a:rPr lang="fi-FI" dirty="0"/>
-              <a:t> id?</a:t>
-            </a:r>
-          </a:p>
-          <a:p>
-            <a:pPr lvl="1"/>
-            <a:r>
-              <a:rPr lang="fi-FI" dirty="0" err="1"/>
-              <a:t>When</a:t>
-            </a:r>
-            <a:r>
-              <a:rPr lang="fi-FI" dirty="0"/>
-              <a:t> </a:t>
-            </a:r>
-            <a:r>
-              <a:rPr lang="fi-FI" dirty="0" err="1"/>
-              <a:t>database</a:t>
-            </a:r>
-            <a:r>
-              <a:rPr lang="fi-FI" dirty="0"/>
-              <a:t> </a:t>
-            </a:r>
-            <a:r>
-              <a:rPr lang="fi-FI" dirty="0" err="1"/>
-              <a:t>creates</a:t>
-            </a:r>
-            <a:r>
-              <a:rPr lang="fi-FI" dirty="0"/>
-              <a:t> </a:t>
-            </a:r>
-            <a:r>
-              <a:rPr lang="fi-FI" dirty="0" err="1"/>
-              <a:t>id:s</a:t>
-            </a:r>
-            <a:r>
-              <a:rPr lang="fi-FI" dirty="0"/>
-              <a:t>, </a:t>
-            </a:r>
-            <a:r>
-              <a:rPr lang="fi-FI" dirty="0" err="1"/>
-              <a:t>how</a:t>
-            </a:r>
-            <a:r>
-              <a:rPr lang="fi-FI" dirty="0"/>
-              <a:t> to </a:t>
-            </a:r>
-            <a:r>
-              <a:rPr lang="fi-FI" dirty="0" err="1"/>
-              <a:t>get</a:t>
-            </a:r>
-            <a:r>
-              <a:rPr lang="fi-FI" dirty="0"/>
-              <a:t> </a:t>
-            </a:r>
-            <a:r>
-              <a:rPr lang="fi-FI" dirty="0" err="1"/>
-              <a:t>that</a:t>
-            </a:r>
-            <a:r>
-              <a:rPr lang="fi-FI" dirty="0"/>
-              <a:t> </a:t>
-            </a:r>
-            <a:r>
-              <a:rPr lang="fi-FI" dirty="0" err="1"/>
-              <a:t>correct</a:t>
-            </a:r>
-            <a:r>
-              <a:rPr lang="fi-FI" dirty="0"/>
-              <a:t> id </a:t>
-            </a:r>
-            <a:r>
-              <a:rPr lang="fi-FI" dirty="0" err="1"/>
-              <a:t>back</a:t>
-            </a:r>
-            <a:r>
-              <a:rPr lang="fi-FI" dirty="0"/>
-              <a:t> to </a:t>
-            </a:r>
-            <a:r>
-              <a:rPr lang="fi-FI" dirty="0" err="1"/>
-              <a:t>frontend</a:t>
-            </a:r>
-            <a:r>
-              <a:rPr lang="fi-FI" dirty="0"/>
-              <a:t> </a:t>
-            </a:r>
-            <a:r>
-              <a:rPr lang="fi-FI" dirty="0" err="1"/>
-              <a:t>that</a:t>
-            </a:r>
-            <a:r>
-              <a:rPr lang="fi-FI" dirty="0"/>
-              <a:t> </a:t>
-            </a:r>
-            <a:r>
-              <a:rPr lang="fi-FI" dirty="0" err="1"/>
-              <a:t>initiated</a:t>
-            </a:r>
-            <a:r>
-              <a:rPr lang="fi-FI" dirty="0"/>
-              <a:t> </a:t>
-            </a:r>
-            <a:r>
-              <a:rPr lang="fi-FI" dirty="0" err="1"/>
-              <a:t>the</a:t>
-            </a:r>
-            <a:r>
-              <a:rPr lang="fi-FI" dirty="0"/>
-              <a:t> </a:t>
-            </a:r>
-            <a:r>
-              <a:rPr lang="fi-FI" dirty="0" err="1"/>
-              <a:t>creation</a:t>
-            </a:r>
-            <a:r>
-              <a:rPr lang="fi-FI" dirty="0"/>
-              <a:t> of </a:t>
-            </a:r>
-            <a:r>
-              <a:rPr lang="fi-FI" dirty="0" err="1"/>
-              <a:t>that</a:t>
-            </a:r>
-            <a:r>
-              <a:rPr lang="fi-FI" dirty="0"/>
-              <a:t> </a:t>
-            </a:r>
-            <a:r>
-              <a:rPr lang="fi-FI" dirty="0" err="1"/>
-              <a:t>new</a:t>
-            </a:r>
-            <a:r>
-              <a:rPr lang="fi-FI" dirty="0"/>
-              <a:t> </a:t>
-            </a:r>
-            <a:r>
-              <a:rPr lang="fi-FI" dirty="0" err="1"/>
-              <a:t>resource</a:t>
-            </a:r>
-            <a:r>
-              <a:rPr lang="fi-FI" dirty="0"/>
-              <a:t>/</a:t>
-            </a:r>
-            <a:r>
-              <a:rPr lang="fi-FI" dirty="0" err="1"/>
-              <a:t>object</a:t>
-            </a:r>
-            <a:r>
-              <a:rPr lang="fi-FI" dirty="0"/>
-              <a:t>?</a:t>
-            </a:r>
-          </a:p>
-          <a:p>
-            <a:pPr lvl="2"/>
-            <a:r>
-              <a:rPr lang="fi-FI" dirty="0" err="1"/>
-              <a:t>Well</a:t>
-            </a:r>
-            <a:r>
-              <a:rPr lang="fi-FI" dirty="0"/>
-              <a:t>, </a:t>
-            </a:r>
-            <a:r>
-              <a:rPr lang="fi-FI" dirty="0" err="1"/>
-              <a:t>e.g</a:t>
-            </a:r>
-            <a:r>
-              <a:rPr lang="fi-FI" dirty="0"/>
-              <a:t>. </a:t>
-            </a:r>
-            <a:r>
-              <a:rPr lang="fi-FI" dirty="0" err="1"/>
-              <a:t>the</a:t>
-            </a:r>
-            <a:r>
-              <a:rPr lang="fi-FI" dirty="0"/>
-              <a:t> </a:t>
-            </a:r>
-            <a:r>
-              <a:rPr lang="fi-FI" dirty="0" err="1"/>
-              <a:t>Knex</a:t>
-            </a:r>
-            <a:r>
-              <a:rPr lang="fi-FI" dirty="0"/>
-              <a:t> </a:t>
-            </a:r>
-            <a:r>
-              <a:rPr lang="fi-FI" dirty="0" err="1"/>
-              <a:t>library</a:t>
-            </a:r>
-            <a:r>
-              <a:rPr lang="fi-FI" dirty="0"/>
-              <a:t> </a:t>
-            </a:r>
-            <a:r>
-              <a:rPr lang="fi-FI" dirty="0" err="1"/>
-              <a:t>returns</a:t>
-            </a:r>
-            <a:r>
-              <a:rPr lang="fi-FI" dirty="0"/>
-              <a:t> an </a:t>
-            </a:r>
-            <a:r>
-              <a:rPr lang="fi-FI" dirty="0" err="1"/>
-              <a:t>array</a:t>
-            </a:r>
-            <a:r>
-              <a:rPr lang="fi-FI" dirty="0"/>
-              <a:t> of </a:t>
-            </a:r>
-            <a:r>
-              <a:rPr lang="fi-FI" dirty="0" err="1"/>
-              <a:t>newly</a:t>
-            </a:r>
-            <a:r>
-              <a:rPr lang="fi-FI" dirty="0"/>
-              <a:t> </a:t>
-            </a:r>
-            <a:r>
-              <a:rPr lang="fi-FI" dirty="0" err="1"/>
-              <a:t>created</a:t>
-            </a:r>
-            <a:r>
-              <a:rPr lang="fi-FI" dirty="0"/>
-              <a:t> </a:t>
-            </a:r>
-            <a:r>
-              <a:rPr lang="fi-FI" dirty="0" err="1"/>
-              <a:t>database</a:t>
-            </a:r>
-            <a:r>
-              <a:rPr lang="fi-FI" dirty="0"/>
-              <a:t> </a:t>
-            </a:r>
-            <a:r>
-              <a:rPr lang="fi-FI" dirty="0" err="1"/>
-              <a:t>row</a:t>
-            </a:r>
-            <a:r>
-              <a:rPr lang="fi-FI" dirty="0"/>
-              <a:t> </a:t>
-            </a:r>
-            <a:r>
-              <a:rPr lang="fi-FI" dirty="0" err="1"/>
-              <a:t>primary</a:t>
-            </a:r>
-            <a:r>
-              <a:rPr lang="fi-FI" dirty="0"/>
-              <a:t> </a:t>
-            </a:r>
-            <a:r>
-              <a:rPr lang="fi-FI" dirty="0" err="1"/>
-              <a:t>keys</a:t>
-            </a:r>
-            <a:r>
-              <a:rPr lang="fi-FI" dirty="0"/>
-              <a:t> </a:t>
-            </a:r>
-            <a:r>
-              <a:rPr lang="fi-FI" dirty="0" err="1"/>
-              <a:t>if</a:t>
-            </a:r>
-            <a:r>
-              <a:rPr lang="fi-FI" dirty="0"/>
-              <a:t> </a:t>
-            </a:r>
-            <a:r>
-              <a:rPr lang="fi-FI" dirty="0" err="1"/>
-              <a:t>success</a:t>
-            </a:r>
-            <a:endParaRPr lang="fi-FI" dirty="0"/>
-          </a:p>
-          <a:p>
-            <a:pPr lvl="2"/>
-            <a:r>
-              <a:rPr lang="fi-FI" dirty="0"/>
-              <a:t>=&gt; Return </a:t>
-            </a:r>
-            <a:r>
-              <a:rPr lang="fi-FI" dirty="0" err="1"/>
-              <a:t>that</a:t>
-            </a:r>
-            <a:r>
-              <a:rPr lang="fi-FI" dirty="0"/>
-              <a:t> to </a:t>
-            </a:r>
-            <a:r>
-              <a:rPr lang="fi-FI" dirty="0" err="1"/>
-              <a:t>the</a:t>
-            </a:r>
-            <a:r>
-              <a:rPr lang="fi-FI" dirty="0"/>
-              <a:t> </a:t>
-            </a:r>
-            <a:r>
-              <a:rPr lang="fi-FI" dirty="0" err="1"/>
-              <a:t>frontend</a:t>
-            </a:r>
-            <a:r>
-              <a:rPr lang="fi-FI" dirty="0"/>
-              <a:t> </a:t>
-            </a:r>
-            <a:r>
-              <a:rPr lang="fi-FI" dirty="0" err="1"/>
-              <a:t>too</a:t>
-            </a:r>
-            <a:r>
-              <a:rPr lang="fi-FI" dirty="0"/>
-              <a:t>, </a:t>
-            </a:r>
-            <a:r>
-              <a:rPr lang="fi-FI" dirty="0" err="1"/>
-              <a:t>e.g</a:t>
-            </a:r>
-            <a:r>
-              <a:rPr lang="fi-FI" dirty="0"/>
-              <a:t>. in an </a:t>
-            </a:r>
-            <a:r>
-              <a:rPr lang="fi-FI" dirty="0" err="1"/>
-              <a:t>object</a:t>
-            </a:r>
-            <a:r>
-              <a:rPr lang="fi-FI" dirty="0"/>
-              <a:t> as JSON in </a:t>
-            </a:r>
-            <a:r>
-              <a:rPr lang="fi-FI" dirty="0" err="1"/>
-              <a:t>body</a:t>
-            </a:r>
-            <a:r>
-              <a:rPr lang="fi-FI" dirty="0"/>
-              <a:t> of </a:t>
-            </a:r>
-            <a:r>
-              <a:rPr lang="fi-FI" dirty="0" err="1"/>
-              <a:t>the</a:t>
-            </a:r>
-            <a:r>
-              <a:rPr lang="fi-FI" dirty="0"/>
-              <a:t> </a:t>
-            </a:r>
-            <a:r>
-              <a:rPr lang="fi-FI" dirty="0" err="1"/>
-              <a:t>response</a:t>
-            </a:r>
-            <a:endParaRPr lang="fi-FI" dirty="0"/>
-          </a:p>
-          <a:p>
-            <a:pPr lvl="1"/>
-            <a:r>
-              <a:rPr lang="fi-FI" dirty="0" err="1"/>
-              <a:t>What</a:t>
-            </a:r>
-            <a:r>
-              <a:rPr lang="fi-FI" dirty="0"/>
-              <a:t> </a:t>
-            </a:r>
-            <a:r>
-              <a:rPr lang="fi-FI" dirty="0" err="1"/>
-              <a:t>if</a:t>
-            </a:r>
-            <a:r>
-              <a:rPr lang="fi-FI" dirty="0"/>
-              <a:t> </a:t>
-            </a:r>
-            <a:r>
-              <a:rPr lang="fi-FI" dirty="0" err="1"/>
-              <a:t>we</a:t>
-            </a:r>
-            <a:r>
-              <a:rPr lang="fi-FI" dirty="0"/>
-              <a:t> </a:t>
-            </a:r>
-            <a:r>
-              <a:rPr lang="fi-FI" dirty="0" err="1"/>
-              <a:t>have</a:t>
-            </a:r>
-            <a:r>
-              <a:rPr lang="fi-FI" dirty="0"/>
-              <a:t> a </a:t>
-            </a:r>
-            <a:r>
-              <a:rPr lang="fi-FI" dirty="0" err="1"/>
-              <a:t>totally</a:t>
-            </a:r>
-            <a:r>
-              <a:rPr lang="fi-FI" dirty="0"/>
-              <a:t> </a:t>
-            </a:r>
-            <a:r>
-              <a:rPr lang="fi-FI" dirty="0" err="1"/>
-              <a:t>distributed</a:t>
-            </a:r>
-            <a:r>
-              <a:rPr lang="fi-FI" dirty="0"/>
-              <a:t> </a:t>
-            </a:r>
-            <a:r>
-              <a:rPr lang="fi-FI" dirty="0" err="1"/>
-              <a:t>architecture</a:t>
-            </a:r>
-            <a:r>
-              <a:rPr lang="fi-FI" dirty="0"/>
-              <a:t> and </a:t>
-            </a:r>
-            <a:r>
-              <a:rPr lang="fi-FI" dirty="0" err="1"/>
-              <a:t>there</a:t>
-            </a:r>
-            <a:r>
-              <a:rPr lang="fi-FI" dirty="0"/>
-              <a:t> is no </a:t>
-            </a:r>
-            <a:r>
-              <a:rPr lang="fi-FI" dirty="0" err="1"/>
-              <a:t>certain</a:t>
-            </a:r>
-            <a:r>
-              <a:rPr lang="fi-FI" dirty="0"/>
-              <a:t> </a:t>
-            </a:r>
-            <a:r>
-              <a:rPr lang="fi-FI" dirty="0" err="1"/>
-              <a:t>database</a:t>
-            </a:r>
-            <a:r>
-              <a:rPr lang="fi-FI" dirty="0"/>
-              <a:t>? </a:t>
-            </a:r>
-            <a:r>
-              <a:rPr lang="fi-FI" dirty="0" err="1"/>
-              <a:t>Or</a:t>
-            </a:r>
-            <a:r>
-              <a:rPr lang="fi-FI" dirty="0"/>
-              <a:t> </a:t>
-            </a:r>
-            <a:r>
-              <a:rPr lang="fi-FI" dirty="0" err="1"/>
-              <a:t>we</a:t>
-            </a:r>
-            <a:r>
-              <a:rPr lang="fi-FI" dirty="0"/>
-              <a:t> </a:t>
-            </a:r>
-            <a:r>
-              <a:rPr lang="fi-FI" dirty="0" err="1"/>
-              <a:t>have</a:t>
-            </a:r>
-            <a:r>
-              <a:rPr lang="fi-FI" dirty="0"/>
-              <a:t> an </a:t>
-            </a:r>
-            <a:r>
-              <a:rPr lang="fi-FI" dirty="0" err="1"/>
-              <a:t>IoT</a:t>
-            </a:r>
-            <a:r>
-              <a:rPr lang="fi-FI" dirty="0"/>
-              <a:t> </a:t>
-            </a:r>
-            <a:r>
-              <a:rPr lang="fi-FI" dirty="0" err="1"/>
-              <a:t>system</a:t>
-            </a:r>
-            <a:r>
-              <a:rPr lang="fi-FI" dirty="0"/>
-              <a:t> </a:t>
-            </a:r>
-            <a:r>
-              <a:rPr lang="fi-FI" dirty="0" err="1"/>
-              <a:t>where</a:t>
-            </a:r>
-            <a:r>
-              <a:rPr lang="fi-FI" dirty="0"/>
-              <a:t> </a:t>
-            </a:r>
-            <a:r>
-              <a:rPr lang="fi-FI" dirty="0" err="1"/>
-              <a:t>devices</a:t>
-            </a:r>
-            <a:r>
-              <a:rPr lang="fi-FI" dirty="0"/>
-              <a:t> </a:t>
-            </a:r>
-            <a:r>
-              <a:rPr lang="fi-FI" dirty="0" err="1"/>
-              <a:t>are</a:t>
-            </a:r>
-            <a:r>
-              <a:rPr lang="fi-FI" dirty="0"/>
-              <a:t> </a:t>
-            </a:r>
-            <a:r>
-              <a:rPr lang="fi-FI" dirty="0" err="1"/>
-              <a:t>e.g</a:t>
-            </a:r>
-            <a:r>
-              <a:rPr lang="fi-FI" dirty="0"/>
-              <a:t>. </a:t>
-            </a:r>
-            <a:r>
-              <a:rPr lang="fi-FI" dirty="0" err="1"/>
-              <a:t>underwater</a:t>
-            </a:r>
-            <a:r>
-              <a:rPr lang="fi-FI" dirty="0"/>
-              <a:t> and </a:t>
-            </a:r>
-            <a:r>
-              <a:rPr lang="fi-FI" dirty="0" err="1"/>
-              <a:t>collect</a:t>
-            </a:r>
-            <a:r>
-              <a:rPr lang="fi-FI" dirty="0"/>
-              <a:t> </a:t>
-            </a:r>
-            <a:r>
-              <a:rPr lang="fi-FI" dirty="0" err="1"/>
-              <a:t>information</a:t>
-            </a:r>
-            <a:r>
-              <a:rPr lang="fi-FI" dirty="0"/>
-              <a:t> and </a:t>
-            </a:r>
-            <a:r>
-              <a:rPr lang="fi-FI" dirty="0" err="1"/>
-              <a:t>events</a:t>
-            </a:r>
-            <a:r>
-              <a:rPr lang="fi-FI" dirty="0"/>
-              <a:t> and </a:t>
-            </a:r>
-            <a:r>
-              <a:rPr lang="fi-FI" dirty="0" err="1"/>
-              <a:t>have</a:t>
-            </a:r>
-            <a:r>
-              <a:rPr lang="fi-FI" dirty="0"/>
-              <a:t> </a:t>
-            </a:r>
-            <a:r>
-              <a:rPr lang="fi-FI" dirty="0" err="1"/>
-              <a:t>access</a:t>
-            </a:r>
-            <a:r>
-              <a:rPr lang="fi-FI" dirty="0"/>
-              <a:t> to </a:t>
-            </a:r>
-            <a:r>
-              <a:rPr lang="fi-FI" dirty="0" err="1"/>
-              <a:t>the</a:t>
-            </a:r>
-            <a:r>
-              <a:rPr lang="fi-FI" dirty="0"/>
-              <a:t> main </a:t>
-            </a:r>
-            <a:r>
-              <a:rPr lang="fi-FI" dirty="0" err="1"/>
-              <a:t>system</a:t>
-            </a:r>
-            <a:r>
-              <a:rPr lang="fi-FI" dirty="0"/>
-              <a:t> </a:t>
-            </a:r>
-            <a:r>
-              <a:rPr lang="fi-FI" dirty="0" err="1"/>
-              <a:t>only</a:t>
-            </a:r>
-            <a:r>
-              <a:rPr lang="fi-FI" dirty="0"/>
-              <a:t> </a:t>
-            </a:r>
-            <a:r>
-              <a:rPr lang="fi-FI" dirty="0" err="1"/>
-              <a:t>occasionally</a:t>
-            </a:r>
-            <a:r>
-              <a:rPr lang="fi-FI" dirty="0"/>
-              <a:t>?</a:t>
-            </a:r>
-          </a:p>
-          <a:p>
-            <a:r>
-              <a:rPr lang="fi-FI" dirty="0" err="1"/>
-              <a:t>Then</a:t>
-            </a:r>
-            <a:r>
-              <a:rPr lang="fi-FI" dirty="0"/>
-              <a:t> </a:t>
-            </a:r>
-            <a:r>
-              <a:rPr lang="fi-FI" dirty="0" err="1"/>
-              <a:t>we</a:t>
-            </a:r>
-            <a:r>
-              <a:rPr lang="fi-FI" dirty="0"/>
-              <a:t> </a:t>
-            </a:r>
-            <a:r>
-              <a:rPr lang="fi-FI" dirty="0" err="1"/>
-              <a:t>start</a:t>
-            </a:r>
-            <a:r>
-              <a:rPr lang="fi-FI" dirty="0"/>
-              <a:t> to </a:t>
-            </a:r>
-            <a:r>
-              <a:rPr lang="fi-FI" dirty="0" err="1"/>
-              <a:t>have</a:t>
-            </a:r>
-            <a:r>
-              <a:rPr lang="fi-FI" dirty="0"/>
-              <a:t> a case for </a:t>
-            </a:r>
-            <a:r>
-              <a:rPr lang="fi-FI" dirty="0" err="1"/>
-              <a:t>system</a:t>
-            </a:r>
-            <a:r>
-              <a:rPr lang="fi-FI" dirty="0"/>
-              <a:t> </a:t>
-            </a:r>
-            <a:r>
-              <a:rPr lang="fi-FI" dirty="0" err="1"/>
-              <a:t>where</a:t>
-            </a:r>
-            <a:r>
-              <a:rPr lang="fi-FI" dirty="0"/>
-              <a:t> _</a:t>
-            </a:r>
-            <a:r>
-              <a:rPr lang="fi-FI" dirty="0" err="1"/>
-              <a:t>everyone</a:t>
-            </a:r>
-            <a:r>
-              <a:rPr lang="fi-FI" dirty="0"/>
-              <a:t>_ </a:t>
-            </a:r>
-            <a:r>
-              <a:rPr lang="fi-FI" dirty="0" err="1"/>
-              <a:t>needs</a:t>
-            </a:r>
-            <a:r>
-              <a:rPr lang="fi-FI" dirty="0"/>
-              <a:t> to </a:t>
-            </a:r>
-            <a:r>
-              <a:rPr lang="fi-FI" dirty="0" err="1"/>
-              <a:t>be</a:t>
-            </a:r>
-            <a:r>
-              <a:rPr lang="fi-FI" dirty="0"/>
-              <a:t> </a:t>
-            </a:r>
-            <a:r>
-              <a:rPr lang="fi-FI" dirty="0" err="1"/>
-              <a:t>able</a:t>
-            </a:r>
-            <a:r>
-              <a:rPr lang="fi-FI" dirty="0"/>
-              <a:t> to </a:t>
-            </a:r>
-            <a:r>
-              <a:rPr lang="fi-FI" dirty="0" err="1"/>
-              <a:t>create</a:t>
             </a:r>
             <a:r>
               <a:rPr lang="fi-FI" dirty="0"/>
@@ -7822,7 +7910,7 @@
           <a:p>
             <a:fld id="{202E1EC2-47B8-044B-A09E-6A63B4D80C87}" type="datetime1">
               <a:rPr lang="fi-FI" smtClean="0"/>
-              <a:t>27.10.2022</a:t>
+              <a:t>30.10.2022</a:t>
             </a:fld>
             <a:endParaRPr lang="en-GB"/>
           </a:p>
@@ -8015,7 +8103,7 @@
             </a:r>
             <a:r>
               <a:rPr lang="fi-FI" i="1" dirty="0"/>
-              <a:t> 2. </a:t>
+              <a:t> and 2. </a:t>
             </a:r>
             <a:r>
               <a:rPr lang="fi-FI" i="1" dirty="0" err="1"/>
@@ -8177,11 +8265,11 @@
             </a:r>
             <a:r>
               <a:rPr lang="fi-FI" dirty="0" err="1"/>
-              <a:t>was</a:t>
-            </a:r>
-            <a:r>
-              <a:rPr lang="fi-FI" dirty="0"/>
-              <a:t> a set of </a:t>
+              <a:t>were</a:t>
+            </a:r>
+            <a:r>
+              <a:rPr lang="fi-FI" dirty="0"/>
+              <a:t> </a:t>
             </a:r>
             <a:r>
               <a:rPr lang="fi-FI" dirty="0" err="1"/>
@@ -8197,10 +8285,42 @@
             </a:r>
             <a:r>
               <a:rPr lang="fi-FI" dirty="0"/>
+              <a:t> </a:t>
+            </a:r>
+            <a:r>
+              <a:rPr lang="fi-FI" dirty="0" err="1"/>
+              <a:t>from</a:t>
+            </a:r>
+            <a:r>
+              <a:rPr lang="fi-FI" dirty="0"/>
+              <a:t> </a:t>
+            </a:r>
+            <a:r>
+              <a:rPr lang="fi-FI" dirty="0" err="1"/>
+              <a:t>lot</a:t>
+            </a:r>
+            <a:r>
+              <a:rPr lang="fi-FI" dirty="0"/>
+              <a:t> of </a:t>
+            </a:r>
+            <a:r>
+              <a:rPr lang="fi-FI" dirty="0" err="1"/>
+              <a:t>companies</a:t>
+            </a:r>
+            <a:r>
+              <a:rPr lang="fi-FI" dirty="0"/>
               <a:t> (</a:t>
             </a:r>
             <a:r>
               <a:rPr lang="fi-FI" dirty="0" err="1"/>
+              <a:t>later</a:t>
+            </a:r>
+            <a:r>
+              <a:rPr lang="fi-FI" dirty="0"/>
+              <a:t> </a:t>
+            </a:r>
+            <a:r>
+              <a:rPr lang="fi-FI" dirty="0" err="1"/>
               <a:t>e.g</a:t>
             </a:r>
             <a:r>
@@ -8245,7 +8365,42 @@
             </a:r>
             <a:r>
               <a:rPr lang="fi-FI" dirty="0"/>
-              <a:t> a 128-bits (</a:t>
+              <a:t> a 128-bit </a:t>
+            </a:r>
+            <a:r>
+              <a:rPr lang="fi-FI" dirty="0" err="1"/>
+              <a:t>number</a:t>
+            </a:r>
+            <a:r>
+              <a:rPr lang="fi-FI" dirty="0"/>
+              <a:t> </a:t>
+            </a:r>
+          </a:p>
+          <a:p>
+            <a:pPr lvl="1"/>
+            <a:r>
+              <a:rPr lang="fi-FI" dirty="0" err="1"/>
+              <a:t>That</a:t>
+            </a:r>
+            <a:r>
+              <a:rPr lang="fi-FI" dirty="0"/>
+              <a:t> </a:t>
+            </a:r>
+            <a:r>
+              <a:rPr lang="fi-FI" dirty="0" err="1"/>
+              <a:t>can</a:t>
+            </a:r>
+            <a:r>
+              <a:rPr lang="fi-FI" dirty="0"/>
+              <a:t> </a:t>
+            </a:r>
+            <a:r>
+              <a:rPr lang="fi-FI" dirty="0" err="1"/>
+              <a:t>be</a:t>
+            </a:r>
+            <a:r>
+              <a:rPr lang="fi-FI" dirty="0"/>
+              <a:t> </a:t>
             </a:r>
             <a:r>
               <a:rPr lang="fi-FI" dirty="0" err="1"/>
@@ -8285,8 +8440,72 @@
             </a:r>
             <a:r>
               <a:rPr lang="fi-FI" dirty="0"/>
-              <a:t>: 123e4567-e89b-12d3-a456-426614174000 ).</a:t>
-            </a:r>
+              <a:t>: 123e4567-e89b-12d3-a456-426614174000.</a:t>
+            </a:r>
+          </a:p>
+          <a:p>
+            <a:pPr lvl="1"/>
+            <a:r>
+              <a:rPr lang="fi-FI" dirty="0" err="1"/>
+              <a:t>That</a:t>
+            </a:r>
+            <a:r>
+              <a:rPr lang="fi-FI" dirty="0"/>
+              <a:t> </a:t>
+            </a:r>
+            <a:r>
+              <a:rPr lang="fi-FI" dirty="0" err="1"/>
+              <a:t>has</a:t>
+            </a:r>
+            <a:r>
+              <a:rPr lang="fi-FI" dirty="0"/>
+              <a:t> 32 </a:t>
+            </a:r>
+            <a:r>
+              <a:rPr lang="fi-FI" dirty="0" err="1"/>
+              <a:t>hexadecimal</a:t>
+            </a:r>
+            <a:r>
+              <a:rPr lang="fi-FI" dirty="0"/>
+              <a:t> </a:t>
+            </a:r>
+            <a:r>
+              <a:rPr lang="fi-FI" dirty="0" err="1"/>
+              <a:t>digits</a:t>
+            </a:r>
+            <a:r>
+              <a:rPr lang="fi-FI" dirty="0"/>
+              <a:t> 0-f </a:t>
+            </a:r>
+            <a:r>
+              <a:rPr lang="fi-FI" dirty="0" err="1"/>
+              <a:t>divided</a:t>
+            </a:r>
+            <a:r>
+              <a:rPr lang="fi-FI" dirty="0"/>
+              <a:t> </a:t>
+            </a:r>
+            <a:r>
+              <a:rPr lang="fi-FI" dirty="0" err="1"/>
+              <a:t>by</a:t>
+            </a:r>
+            <a:r>
+              <a:rPr lang="fi-FI" dirty="0"/>
+              <a:t> </a:t>
+            </a:r>
+            <a:r>
+              <a:rPr lang="fi-FI" dirty="0" err="1"/>
+              <a:t>four</a:t>
+            </a:r>
+            <a:r>
+              <a:rPr lang="fi-FI" dirty="0"/>
+              <a:t> </a:t>
+            </a:r>
+            <a:r>
+              <a:rPr lang="fi-FI" dirty="0" err="1"/>
+              <a:t>dashes</a:t>
+            </a:r>
+            <a:endParaRPr lang="fi-FI" dirty="0"/>
           </a:p>
           <a:p>
             <a:r>
@@ -8315,7 +8534,18 @@
               </a:rPr>
               <a:t>https://en.wikipedia.org/wiki/Universally_unique_identifier#History</a:t>
             </a:r>
-            <a:endParaRPr lang="fi-FI" dirty="0"/>
+            <a:r>
+              <a:rPr lang="fi-FI" dirty="0"/>
+              <a:t> (extra </a:t>
+            </a:r>
+            <a:r>
+              <a:rPr lang="fi-FI" dirty="0" err="1"/>
+              <a:t>reading</a:t>
+            </a:r>
+            <a:r>
+              <a:rPr lang="fi-FI" dirty="0"/>
+              <a:t>)</a:t>
+            </a:r>
           </a:p>
           <a:p>
             <a:r>
@@ -8325,6 +8555,22 @@
             <a:r>
               <a:rPr lang="fi-FI" dirty="0" err="1"/>
               <a:t>explanation</a:t>
+            </a:r>
+            <a:r>
+              <a:rPr lang="fi-FI" dirty="0"/>
+              <a:t> </a:t>
+            </a:r>
+            <a:r>
+              <a:rPr lang="fi-FI" dirty="0" err="1"/>
+              <a:t>or</a:t>
+            </a:r>
+            <a:r>
+              <a:rPr lang="fi-FI" dirty="0"/>
+              <a:t> </a:t>
+            </a:r>
+            <a:r>
+              <a:rPr lang="fi-FI" dirty="0" err="1"/>
+              <a:t>standard</a:t>
             </a:r>
             <a:r>
               <a:rPr lang="fi-FI" dirty="0"/>
@@ -8346,7 +8592,15 @@
             </a:r>
             <a:r>
               <a:rPr lang="fi-FI" dirty="0"/>
-              <a:t> </a:t>
+              <a:t> (extra </a:t>
+            </a:r>
+            <a:r>
+              <a:rPr lang="fi-FI" dirty="0" err="1"/>
+              <a:t>reading</a:t>
+            </a:r>
+            <a:r>
+              <a:rPr lang="fi-FI" dirty="0"/>
+              <a:t>)</a:t>
             </a:r>
           </a:p>
           <a:p>
@@ -8486,6 +8740,14 @@
             </a:r>
             <a:r>
               <a:rPr lang="fi-FI" dirty="0" err="1"/>
+              <a:t>e.g</a:t>
+            </a:r>
+            <a:r>
+              <a:rPr lang="fi-FI" dirty="0"/>
+              <a:t>. </a:t>
+            </a:r>
+            <a:r>
+              <a:rPr lang="fi-FI" dirty="0" err="1"/>
               <a:t>from</a:t>
             </a:r>
             <a:r>
@@ -8522,7 +8784,7 @@
             </a:r>
             <a:r>
               <a:rPr lang="fi-FI" dirty="0"/>
-              <a:t> </a:t>
+              <a:t> MDN </a:t>
             </a:r>
             <a:r>
               <a:rPr lang="fi-FI" dirty="0" err="1"/>
@@ -8561,14 +8823,7 @@
             </a:r>
             <a:r>
               <a:rPr lang="fi-FI" dirty="0"/>
-              <a:t>”</a:t>
-            </a:r>
-          </a:p>
-          <a:p>
-            <a:pPr lvl="1"/>
-            <a:r>
-              <a:rPr lang="fi-FI" dirty="0"/>
-              <a:t>”MDN </a:t>
+              <a:t>”,  ”MDN </a:t>
             </a:r>
             <a:r>
               <a:rPr lang="fi-FI" dirty="0" err="1"/>
@@ -8612,7 +8867,7 @@
           <a:p>
             <a:fld id="{202E1EC2-47B8-044B-A09E-6A63B4D80C87}" type="datetime1">
               <a:rPr lang="fi-FI" smtClean="0"/>
-              <a:t>27.10.2022</a:t>
+              <a:t>30.10.2022</a:t>
             </a:fld>
             <a:endParaRPr lang="en-GB"/>
           </a:p>
@@ -8726,7 +8981,7 @@
             <a:pPr lvl="0"/>
             <a:r>
               <a:rPr lang="en-US" dirty="0"/>
-              <a:t>While testing manually, just print shorter version</a:t>
+              <a:t>While testing manually, short version displayed</a:t>
             </a:r>
             <a:endParaRPr lang="fi-FI" dirty="0"/>
           </a:p>
@@ -8834,11 +9089,251 @@
             </a:r>
             <a:r>
               <a:rPr lang="fi-FI" dirty="0"/>
-              <a:t> </a:t>
-            </a:r>
-            <a:r>
-              <a:rPr lang="fi-FI" dirty="0" err="1"/>
-              <a:t>uuid</a:t>
+              <a:t> UUID to </a:t>
+            </a:r>
+            <a:r>
+              <a:rPr lang="fi-FI" dirty="0" err="1"/>
+              <a:t>be</a:t>
+            </a:r>
+            <a:r>
+              <a:rPr lang="fi-FI" dirty="0"/>
+              <a:t> </a:t>
+            </a:r>
+            <a:r>
+              <a:rPr lang="fi-FI" dirty="0" err="1"/>
+              <a:t>displayed</a:t>
+            </a:r>
+            <a:r>
+              <a:rPr lang="fi-FI" dirty="0"/>
+              <a:t>. </a:t>
+            </a:r>
+          </a:p>
+          <a:p>
+            <a:r>
+              <a:rPr lang="fi-FI" dirty="0" err="1"/>
+              <a:t>E.g</a:t>
+            </a:r>
+            <a:r>
+              <a:rPr lang="fi-FI" dirty="0"/>
+              <a:t>. </a:t>
+            </a:r>
+            <a:r>
+              <a:rPr lang="fi-FI" dirty="0" err="1"/>
+              <a:t>if</a:t>
+            </a:r>
+            <a:r>
+              <a:rPr lang="fi-FI" dirty="0"/>
+              <a:t> </a:t>
+            </a:r>
+            <a:r>
+              <a:rPr lang="fi-FI" dirty="0" err="1"/>
+              <a:t>you</a:t>
+            </a:r>
+            <a:r>
+              <a:rPr lang="fi-FI" dirty="0"/>
+              <a:t> </a:t>
+            </a:r>
+            <a:r>
+              <a:rPr lang="fi-FI" dirty="0" err="1"/>
+              <a:t>take</a:t>
+            </a:r>
+            <a:r>
+              <a:rPr lang="fi-FI" dirty="0"/>
+              <a:t> </a:t>
+            </a:r>
+            <a:r>
+              <a:rPr lang="fi-FI" dirty="0" err="1"/>
+              <a:t>four</a:t>
+            </a:r>
+            <a:r>
+              <a:rPr lang="fi-FI" dirty="0"/>
+              <a:t> hex </a:t>
+            </a:r>
+            <a:r>
+              <a:rPr lang="fi-FI" dirty="0" err="1"/>
+              <a:t>digits</a:t>
+            </a:r>
+            <a:r>
+              <a:rPr lang="fi-FI" dirty="0"/>
+              <a:t> </a:t>
+            </a:r>
+            <a:r>
+              <a:rPr lang="fi-FI" dirty="0" err="1"/>
+              <a:t>from</a:t>
+            </a:r>
+            <a:r>
+              <a:rPr lang="fi-FI" dirty="0"/>
+              <a:t> some </a:t>
+            </a:r>
+            <a:r>
+              <a:rPr lang="fi-FI" dirty="0" err="1"/>
+              <a:t>part</a:t>
+            </a:r>
+            <a:r>
+              <a:rPr lang="fi-FI" dirty="0"/>
+              <a:t> </a:t>
+            </a:r>
+            <a:r>
+              <a:rPr lang="fi-FI" dirty="0" err="1"/>
+              <a:t>that</a:t>
+            </a:r>
+            <a:r>
+              <a:rPr lang="fi-FI" dirty="0"/>
+              <a:t> is </a:t>
+            </a:r>
+            <a:r>
+              <a:rPr lang="fi-FI" dirty="0" err="1"/>
+              <a:t>fully</a:t>
+            </a:r>
+            <a:r>
+              <a:rPr lang="fi-FI" dirty="0"/>
+              <a:t> </a:t>
+            </a:r>
+            <a:r>
+              <a:rPr lang="fi-FI" dirty="0" err="1"/>
+              <a:t>random</a:t>
+            </a:r>
+            <a:r>
+              <a:rPr lang="fi-FI" dirty="0"/>
+              <a:t>, </a:t>
+            </a:r>
+            <a:r>
+              <a:rPr lang="fi-FI" dirty="0" err="1"/>
+              <a:t>the</a:t>
+            </a:r>
+            <a:r>
+              <a:rPr lang="fi-FI" dirty="0"/>
+              <a:t> </a:t>
+            </a:r>
+            <a:r>
+              <a:rPr lang="fi-FI" dirty="0" err="1"/>
+              <a:t>chance</a:t>
+            </a:r>
+            <a:r>
+              <a:rPr lang="fi-FI" dirty="0"/>
+              <a:t> for </a:t>
+            </a:r>
+            <a:r>
+              <a:rPr lang="fi-FI" dirty="0" err="1"/>
+              <a:t>getting</a:t>
+            </a:r>
+            <a:r>
+              <a:rPr lang="fi-FI" dirty="0"/>
+              <a:t> </a:t>
+            </a:r>
+            <a:r>
+              <a:rPr lang="fi-FI" dirty="0" err="1"/>
+              <a:t>same</a:t>
+            </a:r>
+            <a:r>
+              <a:rPr lang="fi-FI" dirty="0"/>
+              <a:t> </a:t>
+            </a:r>
+            <a:r>
+              <a:rPr lang="fi-FI" dirty="0" err="1"/>
+              <a:t>sequence</a:t>
+            </a:r>
+            <a:r>
+              <a:rPr lang="fi-FI" dirty="0"/>
+              <a:t> is </a:t>
+            </a:r>
+          </a:p>
+          <a:p>
+            <a:pPr lvl="1"/>
+            <a:r>
+              <a:rPr lang="fi-FI" dirty="0"/>
+              <a:t>1 / 16^4 = </a:t>
+            </a:r>
+            <a:r>
+              <a:rPr lang="fi-FI" dirty="0" err="1"/>
+              <a:t>one</a:t>
+            </a:r>
+            <a:r>
+              <a:rPr lang="fi-FI" dirty="0"/>
+              <a:t> out of 65 536</a:t>
+            </a:r>
+          </a:p>
+          <a:p>
+            <a:pPr lvl="1"/>
+            <a:r>
+              <a:rPr lang="fi-FI" dirty="0" err="1"/>
+              <a:t>which</a:t>
+            </a:r>
+            <a:r>
+              <a:rPr lang="fi-FI" dirty="0"/>
+              <a:t> is </a:t>
+            </a:r>
+            <a:r>
+              <a:rPr lang="fi-FI" dirty="0" err="1"/>
+              <a:t>apparently</a:t>
+            </a:r>
+            <a:r>
+              <a:rPr lang="fi-FI" dirty="0"/>
+              <a:t> </a:t>
+            </a:r>
+            <a:r>
+              <a:rPr lang="fi-FI" dirty="0" err="1"/>
+              <a:t>enough</a:t>
+            </a:r>
+            <a:r>
+              <a:rPr lang="fi-FI" dirty="0"/>
+              <a:t> for some </a:t>
+            </a:r>
+            <a:r>
+              <a:rPr lang="fi-FI" dirty="0" err="1"/>
+              <a:t>initial</a:t>
+            </a:r>
+            <a:r>
+              <a:rPr lang="fi-FI" dirty="0"/>
+              <a:t> </a:t>
+            </a:r>
+            <a:r>
+              <a:rPr lang="fi-FI" dirty="0" err="1"/>
+              <a:t>manual</a:t>
+            </a:r>
+            <a:r>
+              <a:rPr lang="fi-FI" dirty="0"/>
+              <a:t> </a:t>
+            </a:r>
+            <a:r>
+              <a:rPr lang="fi-FI" dirty="0" err="1"/>
+              <a:t>testing</a:t>
+            </a:r>
+            <a:endParaRPr lang="fi-FI" dirty="0"/>
+          </a:p>
+          <a:p>
+            <a:pPr lvl="1"/>
+            <a:r>
+              <a:rPr lang="fi-FI" dirty="0"/>
+              <a:t>Still for </a:t>
+            </a:r>
+            <a:r>
+              <a:rPr lang="fi-FI" dirty="0" err="1"/>
+              <a:t>human</a:t>
+            </a:r>
+            <a:r>
+              <a:rPr lang="fi-FI" dirty="0"/>
+              <a:t> </a:t>
+            </a:r>
+            <a:r>
+              <a:rPr lang="fi-FI" dirty="0" err="1"/>
+              <a:t>it’s</a:t>
+            </a:r>
+            <a:r>
+              <a:rPr lang="fi-FI" dirty="0"/>
+              <a:t> </a:t>
+            </a:r>
+            <a:r>
+              <a:rPr lang="fi-FI" dirty="0" err="1"/>
+              <a:t>rather</a:t>
+            </a:r>
+            <a:r>
+              <a:rPr lang="fi-FI" dirty="0"/>
+              <a:t> </a:t>
+            </a:r>
+            <a:r>
+              <a:rPr lang="fi-FI" dirty="0" err="1"/>
+              <a:t>easy</a:t>
             </a:r>
             <a:r>
               <a:rPr lang="fi-FI" dirty="0"/>
@@ -8846,164 +9341,106 @@
             </a:r>
             <a:r>
               <a:rPr lang="fi-FI" dirty="0" err="1"/>
-              <a:t>be</a:t>
-            </a:r>
-            <a:r>
-              <a:rPr lang="fi-FI" dirty="0"/>
-              <a:t> </a:t>
-            </a:r>
-            <a:r>
-              <a:rPr lang="fi-FI" dirty="0" err="1"/>
-              <a:t>displayed</a:t>
+              <a:t>spot</a:t>
+            </a:r>
+            <a:r>
+              <a:rPr lang="fi-FI" dirty="0"/>
+              <a:t> </a:t>
+            </a:r>
+            <a:r>
+              <a:rPr lang="fi-FI" dirty="0" err="1"/>
+              <a:t>the</a:t>
+            </a:r>
+            <a:r>
+              <a:rPr lang="fi-FI" dirty="0"/>
+              <a:t> </a:t>
+            </a:r>
+            <a:r>
+              <a:rPr lang="fi-FI" dirty="0" err="1"/>
+              <a:t>values</a:t>
+            </a:r>
+            <a:r>
+              <a:rPr lang="fi-FI" dirty="0"/>
+              <a:t> as </a:t>
+            </a:r>
+            <a:r>
+              <a:rPr lang="fi-FI" dirty="0" err="1"/>
+              <a:t>different</a:t>
+            </a:r>
+            <a:r>
+              <a:rPr lang="fi-FI" dirty="0"/>
+              <a:t> </a:t>
+            </a:r>
+            <a:r>
+              <a:rPr lang="fi-FI" dirty="0" err="1"/>
+              <a:t>id:s</a:t>
+            </a:r>
+            <a:r>
+              <a:rPr lang="fi-FI" dirty="0"/>
+              <a:t> </a:t>
+            </a:r>
+          </a:p>
+          <a:p>
+            <a:pPr lvl="1"/>
+            <a:r>
+              <a:rPr lang="fi-FI" dirty="0"/>
+              <a:t>and </a:t>
+            </a:r>
+            <a:r>
+              <a:rPr lang="fi-FI" dirty="0" err="1"/>
+              <a:t>thus</a:t>
+            </a:r>
+            <a:r>
+              <a:rPr lang="fi-FI" dirty="0"/>
+              <a:t> </a:t>
+            </a:r>
+            <a:r>
+              <a:rPr lang="fi-FI" dirty="0" err="1"/>
+              <a:t>connect</a:t>
+            </a:r>
+            <a:r>
+              <a:rPr lang="fi-FI" dirty="0"/>
+              <a:t> </a:t>
+            </a:r>
+            <a:r>
+              <a:rPr lang="fi-FI" dirty="0" err="1"/>
+              <a:t>the</a:t>
+            </a:r>
+            <a:r>
+              <a:rPr lang="fi-FI" dirty="0"/>
+              <a:t> </a:t>
+            </a:r>
+            <a:r>
+              <a:rPr lang="fi-FI" dirty="0" err="1"/>
+              <a:t>one</a:t>
+            </a:r>
+            <a:r>
+              <a:rPr lang="fi-FI" dirty="0"/>
+              <a:t> </a:t>
+            </a:r>
+            <a:r>
+              <a:rPr lang="fi-FI" dirty="0" err="1"/>
+              <a:t>created</a:t>
+            </a:r>
+            <a:r>
+              <a:rPr lang="fi-FI" dirty="0"/>
+              <a:t> </a:t>
+            </a:r>
+            <a:r>
+              <a:rPr lang="fi-FI" dirty="0" err="1"/>
+              <a:t>e.g</a:t>
             </a:r>
             <a:r>
               <a:rPr lang="fi-FI" dirty="0"/>
               <a:t>. </a:t>
             </a:r>
-          </a:p>
-          <a:p>
-            <a:r>
-              <a:rPr lang="fi-FI" dirty="0" err="1"/>
-              <a:t>E.g</a:t>
-            </a:r>
-            <a:r>
-              <a:rPr lang="fi-FI" dirty="0"/>
-              <a:t>. </a:t>
-            </a:r>
-            <a:r>
-              <a:rPr lang="fi-FI" dirty="0" err="1"/>
-              <a:t>if</a:t>
-            </a:r>
-            <a:r>
-              <a:rPr lang="fi-FI" dirty="0"/>
-              <a:t> </a:t>
-            </a:r>
-            <a:r>
-              <a:rPr lang="fi-FI" dirty="0" err="1"/>
-              <a:t>you</a:t>
-            </a:r>
-            <a:r>
-              <a:rPr lang="fi-FI" dirty="0"/>
-              <a:t> </a:t>
-            </a:r>
-            <a:r>
-              <a:rPr lang="fi-FI" dirty="0" err="1"/>
-              <a:t>take</a:t>
-            </a:r>
-            <a:r>
-              <a:rPr lang="fi-FI" dirty="0"/>
-              <a:t> </a:t>
-            </a:r>
-            <a:r>
-              <a:rPr lang="fi-FI" dirty="0" err="1"/>
-              <a:t>four</a:t>
-            </a:r>
-            <a:r>
-              <a:rPr lang="fi-FI" dirty="0"/>
-              <a:t> hex </a:t>
-            </a:r>
-            <a:r>
-              <a:rPr lang="fi-FI" dirty="0" err="1"/>
-              <a:t>digits</a:t>
-            </a:r>
-            <a:r>
-              <a:rPr lang="fi-FI" dirty="0"/>
-              <a:t> </a:t>
-            </a:r>
-            <a:r>
-              <a:rPr lang="fi-FI" dirty="0" err="1"/>
-              <a:t>from</a:t>
-            </a:r>
-            <a:r>
-              <a:rPr lang="fi-FI" dirty="0"/>
-              <a:t> </a:t>
-            </a:r>
-            <a:r>
-              <a:rPr lang="fi-FI" dirty="0" err="1"/>
-              <a:t>the</a:t>
-            </a:r>
-            <a:r>
-              <a:rPr lang="fi-FI" dirty="0"/>
-              <a:t> </a:t>
-            </a:r>
-            <a:r>
-              <a:rPr lang="fi-FI" dirty="0" err="1"/>
-              <a:t>part</a:t>
-            </a:r>
-            <a:r>
-              <a:rPr lang="fi-FI" dirty="0"/>
-              <a:t> </a:t>
-            </a:r>
-            <a:r>
-              <a:rPr lang="fi-FI" dirty="0" err="1"/>
-              <a:t>that</a:t>
-            </a:r>
-            <a:r>
-              <a:rPr lang="fi-FI" dirty="0"/>
-              <a:t> is </a:t>
-            </a:r>
-            <a:r>
-              <a:rPr lang="fi-FI" dirty="0" err="1"/>
-              <a:t>fully</a:t>
-            </a:r>
-            <a:r>
-              <a:rPr lang="fi-FI" dirty="0"/>
-              <a:t> </a:t>
-            </a:r>
-            <a:r>
-              <a:rPr lang="fi-FI" dirty="0" err="1"/>
-              <a:t>random</a:t>
-            </a:r>
-            <a:r>
-              <a:rPr lang="fi-FI" dirty="0"/>
-              <a:t>, </a:t>
-            </a:r>
-            <a:r>
-              <a:rPr lang="fi-FI" dirty="0" err="1"/>
-              <a:t>the</a:t>
-            </a:r>
-            <a:r>
-              <a:rPr lang="fi-FI" dirty="0"/>
-              <a:t> </a:t>
-            </a:r>
-            <a:r>
-              <a:rPr lang="fi-FI" dirty="0" err="1"/>
-              <a:t>chance</a:t>
-            </a:r>
-            <a:r>
-              <a:rPr lang="fi-FI" dirty="0"/>
-              <a:t> for </a:t>
-            </a:r>
-            <a:r>
-              <a:rPr lang="fi-FI" dirty="0" err="1"/>
-              <a:t>getting</a:t>
-            </a:r>
-            <a:r>
-              <a:rPr lang="fi-FI" dirty="0"/>
-              <a:t> </a:t>
-            </a:r>
-            <a:r>
-              <a:rPr lang="fi-FI" dirty="0" err="1"/>
-              <a:t>same</a:t>
-            </a:r>
-            <a:r>
-              <a:rPr lang="fi-FI" dirty="0"/>
-              <a:t> </a:t>
-            </a:r>
-            <a:r>
-              <a:rPr lang="fi-FI" dirty="0" err="1"/>
-              <a:t>sequence</a:t>
-            </a:r>
-            <a:r>
-              <a:rPr lang="fi-FI" dirty="0"/>
-              <a:t> is </a:t>
-            </a:r>
-          </a:p>
-          <a:p>
-            <a:pPr lvl="1"/>
-            <a:r>
-              <a:rPr lang="fi-FI" dirty="0"/>
-              <a:t>1 / 16^4 = </a:t>
+            <a:r>
+              <a:rPr lang="fi-FI" dirty="0" err="1"/>
+              <a:t>by</a:t>
+            </a:r>
+            <a:r>
+              <a:rPr lang="fi-FI" dirty="0"/>
+              <a:t> </a:t>
             </a:r>
             <a:r>
               <a:rPr lang="fi-FI" dirty="0" err="1"/>
@@ -9011,130 +9448,11 @@
             </a:r>
             <a:r>
               <a:rPr lang="fi-FI" dirty="0"/>
-              <a:t> out of 65536</a:t>
-            </a:r>
-          </a:p>
-          <a:p>
-            <a:pPr lvl="1"/>
-            <a:r>
-              <a:rPr lang="fi-FI" dirty="0" err="1"/>
-              <a:t>which</a:t>
-            </a:r>
-            <a:r>
-              <a:rPr lang="fi-FI" dirty="0"/>
-              <a:t> is </a:t>
-            </a:r>
-            <a:r>
-              <a:rPr lang="fi-FI" dirty="0" err="1"/>
-              <a:t>apparently</a:t>
-            </a:r>
-            <a:r>
-              <a:rPr lang="fi-FI" dirty="0"/>
-              <a:t> </a:t>
-            </a:r>
-            <a:r>
-              <a:rPr lang="fi-FI" dirty="0" err="1"/>
-              <a:t>enough</a:t>
-            </a:r>
-            <a:r>
-              <a:rPr lang="fi-FI" dirty="0"/>
-              <a:t> for some </a:t>
-            </a:r>
-            <a:r>
-              <a:rPr lang="fi-FI" dirty="0" err="1"/>
-              <a:t>initial</a:t>
-            </a:r>
-            <a:r>
-              <a:rPr lang="fi-FI" dirty="0"/>
-              <a:t> </a:t>
-            </a:r>
-            <a:r>
-              <a:rPr lang="fi-FI" dirty="0" err="1"/>
-              <a:t>manual</a:t>
-            </a:r>
-            <a:r>
-              <a:rPr lang="fi-FI" dirty="0"/>
-              <a:t> </a:t>
-            </a:r>
-            <a:r>
-              <a:rPr lang="fi-FI" dirty="0" err="1"/>
-              <a:t>testing</a:t>
-            </a:r>
-            <a:endParaRPr lang="fi-FI" dirty="0"/>
-          </a:p>
-          <a:p>
-            <a:pPr lvl="1"/>
-            <a:r>
-              <a:rPr lang="fi-FI" dirty="0"/>
-              <a:t>Still for </a:t>
-            </a:r>
-            <a:r>
-              <a:rPr lang="fi-FI" dirty="0" err="1"/>
-              <a:t>human</a:t>
-            </a:r>
-            <a:r>
-              <a:rPr lang="fi-FI" dirty="0"/>
-              <a:t> </a:t>
-            </a:r>
-            <a:r>
-              <a:rPr lang="fi-FI" dirty="0" err="1"/>
-              <a:t>it’s</a:t>
-            </a:r>
-            <a:r>
-              <a:rPr lang="fi-FI" dirty="0"/>
-              <a:t> </a:t>
-            </a:r>
-            <a:r>
-              <a:rPr lang="fi-FI" dirty="0" err="1"/>
-              <a:t>rather</a:t>
-            </a:r>
-            <a:r>
-              <a:rPr lang="fi-FI" dirty="0"/>
-              <a:t> </a:t>
-            </a:r>
-            <a:r>
-              <a:rPr lang="fi-FI" dirty="0" err="1"/>
-              <a:t>easy</a:t>
-            </a:r>
-            <a:r>
-              <a:rPr lang="fi-FI" dirty="0"/>
-              <a:t> to </a:t>
-            </a:r>
-            <a:r>
-              <a:rPr lang="fi-FI" dirty="0" err="1"/>
-              <a:t>spot</a:t>
-            </a:r>
-            <a:r>
-              <a:rPr lang="fi-FI" dirty="0"/>
-              <a:t> </a:t>
-            </a:r>
-            <a:r>
-              <a:rPr lang="fi-FI" dirty="0" err="1"/>
-              <a:t>the</a:t>
-            </a:r>
-            <a:r>
-              <a:rPr lang="fi-FI" dirty="0"/>
-              <a:t> </a:t>
-            </a:r>
-            <a:r>
-              <a:rPr lang="fi-FI" dirty="0" err="1"/>
-              <a:t>values</a:t>
-            </a:r>
-            <a:r>
-              <a:rPr lang="fi-FI" dirty="0"/>
-              <a:t> as </a:t>
-            </a:r>
-            <a:r>
-              <a:rPr lang="fi-FI" dirty="0" err="1"/>
-              <a:t>different</a:t>
-            </a:r>
-            <a:r>
-              <a:rPr lang="fi-FI" dirty="0"/>
-              <a:t> </a:t>
-            </a:r>
-            <a:r>
-              <a:rPr lang="fi-FI" dirty="0" err="1"/>
-              <a:t>id:s</a:t>
+              <a:t> </a:t>
+            </a:r>
+            <a:r>
+              <a:rPr lang="fi-FI" dirty="0" err="1"/>
+              <a:t>client</a:t>
             </a:r>
             <a:r>
               <a:rPr lang="fi-FI" dirty="0"/>
@@ -9142,43 +9460,11 @@
             </a:r>
             <a:r>
               <a:rPr lang="fi-FI" dirty="0" err="1"/>
-              <a:t>connect</a:t>
-            </a:r>
-            <a:r>
-              <a:rPr lang="fi-FI" dirty="0"/>
-              <a:t> </a:t>
-            </a:r>
-            <a:r>
-              <a:rPr lang="fi-FI" dirty="0" err="1"/>
-              <a:t>the</a:t>
-            </a:r>
-            <a:r>
-              <a:rPr lang="fi-FI" dirty="0"/>
-              <a:t> </a:t>
-            </a:r>
-            <a:r>
-              <a:rPr lang="fi-FI" dirty="0" err="1"/>
-              <a:t>one</a:t>
-            </a:r>
-            <a:r>
-              <a:rPr lang="fi-FI" dirty="0"/>
-              <a:t> </a:t>
-            </a:r>
-            <a:r>
-              <a:rPr lang="fi-FI" dirty="0" err="1"/>
-              <a:t>created</a:t>
-            </a:r>
-            <a:r>
-              <a:rPr lang="fi-FI" dirty="0"/>
-              <a:t> </a:t>
-            </a:r>
-            <a:r>
-              <a:rPr lang="fi-FI" dirty="0" err="1"/>
-              <a:t>e.g</a:t>
-            </a:r>
-            <a:r>
-              <a:rPr lang="fi-FI" dirty="0"/>
-              <a:t>. </a:t>
+              <a:t>shown</a:t>
+            </a:r>
+            <a:r>
+              <a:rPr lang="fi-FI" dirty="0"/>
+              <a:t> </a:t>
             </a:r>
             <a:r>
               <a:rPr lang="fi-FI" dirty="0" err="1"/>
@@ -9190,39 +9476,7 @@
             </a:r>
             <a:r>
               <a:rPr lang="fi-FI" dirty="0" err="1"/>
-              <a:t>one</a:t>
-            </a:r>
-            <a:r>
-              <a:rPr lang="fi-FI" dirty="0"/>
-              <a:t> </a:t>
-            </a:r>
-            <a:r>
-              <a:rPr lang="fi-FI" dirty="0" err="1"/>
-              <a:t>client</a:t>
-            </a:r>
-            <a:r>
-              <a:rPr lang="fi-FI" dirty="0"/>
-              <a:t> and </a:t>
-            </a:r>
-            <a:r>
-              <a:rPr lang="fi-FI" dirty="0" err="1"/>
-              <a:t>shown</a:t>
-            </a:r>
-            <a:r>
-              <a:rPr lang="fi-FI" dirty="0"/>
-              <a:t> </a:t>
-            </a:r>
-            <a:r>
-              <a:rPr lang="fi-FI" dirty="0" err="1"/>
-              <a:t>by</a:t>
-            </a:r>
-            <a:r>
-              <a:rPr lang="fi-FI" dirty="0"/>
-              <a:t> </a:t>
-            </a:r>
-            <a:r>
-              <a:rPr lang="fi-FI" dirty="0" err="1"/>
-              <a:t>other</a:t>
+              <a:t>another</a:t>
             </a:r>
             <a:r>
               <a:rPr lang="fi-FI" dirty="0"/>
@@ -9427,7 +9681,7 @@
           <a:p>
             <a:fld id="{202E1EC2-47B8-044B-A09E-6A63B4D80C87}" type="datetime1">
               <a:rPr lang="fi-FI" smtClean="0"/>
-              <a:t>27.10.2022</a:t>
+              <a:t>30.10.2022</a:t>
             </a:fld>
             <a:endParaRPr lang="en-GB"/>
           </a:p>
@@ -9541,7 +9795,7 @@
             <a:pPr lvl="0"/>
             <a:r>
               <a:rPr lang="en-US" dirty="0"/>
-              <a:t>Random generation is complicated for computers</a:t>
+              <a:t>Extra: Random generation is hard for computers</a:t>
             </a:r>
             <a:endParaRPr lang="fi-FI" dirty="0"/>
           </a:p>
@@ -9576,1203 +9830,111 @@
           <a:lstStyle/>
           <a:p>
             <a:r>
-              <a:rPr lang="fi-FI" b="1" dirty="0" err="1"/>
-              <a:t>Note</a:t>
-            </a:r>
-            <a:r>
-              <a:rPr lang="fi-FI" b="1" dirty="0"/>
-              <a:t>: </a:t>
-            </a:r>
-            <a:r>
-              <a:rPr lang="fi-FI" dirty="0" err="1"/>
-              <a:t>Really</a:t>
-            </a:r>
-            <a:r>
-              <a:rPr lang="fi-FI" dirty="0"/>
-              <a:t> </a:t>
-            </a:r>
-            <a:r>
-              <a:rPr lang="fi-FI" dirty="0" err="1"/>
-              <a:t>random</a:t>
-            </a:r>
-            <a:r>
-              <a:rPr lang="fi-FI" dirty="0"/>
-              <a:t> </a:t>
-            </a:r>
-            <a:r>
-              <a:rPr lang="fi-FI" dirty="0" err="1"/>
-              <a:t>generation</a:t>
-            </a:r>
-            <a:r>
-              <a:rPr lang="fi-FI" dirty="0"/>
-              <a:t> is </a:t>
-            </a:r>
-            <a:r>
-              <a:rPr lang="fi-FI" dirty="0" err="1"/>
-              <a:t>difficult</a:t>
-            </a:r>
-            <a:r>
-              <a:rPr lang="fi-FI" dirty="0"/>
-              <a:t> for </a:t>
-            </a:r>
-            <a:r>
-              <a:rPr lang="fi-FI" dirty="0" err="1"/>
-              <a:t>exact</a:t>
-            </a:r>
-            <a:r>
-              <a:rPr lang="fi-FI" dirty="0"/>
-              <a:t> </a:t>
-            </a:r>
-            <a:r>
-              <a:rPr lang="fi-FI" dirty="0" err="1"/>
-              <a:t>logical</a:t>
-            </a:r>
-            <a:r>
-              <a:rPr lang="fi-FI" dirty="0"/>
-              <a:t> </a:t>
-            </a:r>
-            <a:r>
-              <a:rPr lang="fi-FI" dirty="0" err="1"/>
-              <a:t>digital</a:t>
-            </a:r>
-            <a:r>
-              <a:rPr lang="fi-FI" dirty="0"/>
-              <a:t> </a:t>
-            </a:r>
-            <a:r>
-              <a:rPr lang="fi-FI" dirty="0" err="1"/>
-              <a:t>devices</a:t>
-            </a:r>
-            <a:r>
-              <a:rPr lang="fi-FI" dirty="0"/>
-              <a:t> </a:t>
-            </a:r>
-            <a:r>
-              <a:rPr lang="fi-FI" dirty="0" err="1"/>
-              <a:t>like</a:t>
-            </a:r>
-            <a:r>
-              <a:rPr lang="fi-FI" dirty="0"/>
-              <a:t> </a:t>
-            </a:r>
-            <a:r>
-              <a:rPr lang="fi-FI" dirty="0" err="1"/>
-              <a:t>computers</a:t>
-            </a:r>
-            <a:r>
-              <a:rPr lang="fi-FI" dirty="0"/>
-              <a:t>. </a:t>
-            </a:r>
-          </a:p>
-          <a:p>
-            <a:r>
-              <a:rPr lang="fi-FI" dirty="0" err="1"/>
-              <a:t>Implementing</a:t>
-            </a:r>
-            <a:r>
-              <a:rPr lang="fi-FI" dirty="0"/>
-              <a:t> </a:t>
-            </a:r>
-            <a:r>
-              <a:rPr lang="fi-FI" dirty="0" err="1"/>
-              <a:t>your</a:t>
-            </a:r>
-            <a:r>
-              <a:rPr lang="fi-FI" dirty="0"/>
-              <a:t> </a:t>
-            </a:r>
-            <a:r>
-              <a:rPr lang="fi-FI" dirty="0" err="1"/>
-              <a:t>own</a:t>
-            </a:r>
-            <a:r>
-              <a:rPr lang="fi-FI" dirty="0"/>
-              <a:t> </a:t>
-            </a:r>
-            <a:r>
-              <a:rPr lang="fi-FI" dirty="0" err="1"/>
-              <a:t>would</a:t>
-            </a:r>
-            <a:r>
-              <a:rPr lang="fi-FI" dirty="0"/>
-              <a:t> </a:t>
-            </a:r>
-            <a:r>
-              <a:rPr lang="fi-FI" dirty="0" err="1"/>
-              <a:t>be</a:t>
-            </a:r>
-            <a:r>
-              <a:rPr lang="fi-FI" dirty="0"/>
-              <a:t> </a:t>
-            </a:r>
-            <a:r>
-              <a:rPr lang="fi-FI" dirty="0" err="1"/>
-              <a:t>working</a:t>
-            </a:r>
-            <a:r>
-              <a:rPr lang="fi-FI" dirty="0"/>
-              <a:t> </a:t>
-            </a:r>
-            <a:r>
-              <a:rPr lang="fi-FI" dirty="0" err="1"/>
-              <a:t>fine</a:t>
-            </a:r>
-            <a:r>
-              <a:rPr lang="fi-FI" dirty="0"/>
-              <a:t> </a:t>
-            </a:r>
-            <a:r>
-              <a:rPr lang="fi-FI" dirty="0" err="1"/>
-              <a:t>if</a:t>
-            </a:r>
-            <a:r>
-              <a:rPr lang="fi-FI" dirty="0"/>
-              <a:t> </a:t>
-            </a:r>
-            <a:r>
-              <a:rPr lang="fi-FI" dirty="0" err="1"/>
-              <a:t>you</a:t>
-            </a:r>
-            <a:r>
-              <a:rPr lang="fi-FI" dirty="0"/>
-              <a:t> </a:t>
-            </a:r>
-            <a:r>
-              <a:rPr lang="fi-FI" dirty="0" err="1"/>
-              <a:t>are</a:t>
-            </a:r>
-            <a:r>
-              <a:rPr lang="fi-FI" dirty="0"/>
-              <a:t> a </a:t>
-            </a:r>
-            <a:r>
-              <a:rPr lang="fi-FI" dirty="0" err="1"/>
-              <a:t>PhD</a:t>
-            </a:r>
-            <a:r>
-              <a:rPr lang="fi-FI" dirty="0"/>
-              <a:t> </a:t>
-            </a:r>
-            <a:r>
-              <a:rPr lang="fi-FI" dirty="0" err="1"/>
-              <a:t>specialized</a:t>
-            </a:r>
-            <a:r>
-              <a:rPr lang="fi-FI" dirty="0"/>
-              <a:t> in </a:t>
-            </a:r>
-            <a:r>
-              <a:rPr lang="fi-FI" dirty="0" err="1"/>
-              <a:t>cryptography</a:t>
-            </a:r>
-            <a:r>
-              <a:rPr lang="fi-FI" dirty="0"/>
-              <a:t> </a:t>
-            </a:r>
-            <a:r>
-              <a:rPr lang="fi-FI" dirty="0" err="1"/>
-              <a:t>or</a:t>
-            </a:r>
-            <a:r>
-              <a:rPr lang="fi-FI" dirty="0"/>
-              <a:t> </a:t>
-            </a:r>
-            <a:r>
-              <a:rPr lang="fi-FI" dirty="0" err="1"/>
-              <a:t>related</a:t>
-            </a:r>
-            <a:r>
-              <a:rPr lang="fi-FI" dirty="0"/>
-              <a:t> </a:t>
-            </a:r>
-            <a:r>
-              <a:rPr lang="fi-FI" dirty="0" err="1"/>
-              <a:t>mathematics</a:t>
-            </a:r>
-            <a:r>
-              <a:rPr lang="fi-FI" dirty="0"/>
-              <a:t>. </a:t>
+              <a:rPr lang="en-US" b="1" dirty="0"/>
+              <a:t>Note: </a:t>
+            </a:r>
+            <a:r>
+              <a:rPr lang="en-US" dirty="0"/>
+              <a:t>True random generation is difficult for exact logical digital devices like computers. </a:t>
+            </a:r>
+          </a:p>
+          <a:p>
+            <a:r>
+              <a:rPr lang="en-US" dirty="0"/>
+              <a:t>Implementing your own randomizer would be working fine if you are a PhD specialized in cryptography or related mathematics. </a:t>
             </a:r>
           </a:p>
           <a:p>
             <a:pPr lvl="1"/>
             <a:r>
-              <a:rPr lang="fi-FI" dirty="0"/>
-              <a:t>And </a:t>
-            </a:r>
-            <a:r>
-              <a:rPr lang="fi-FI" dirty="0" err="1"/>
-              <a:t>even</a:t>
-            </a:r>
-            <a:r>
-              <a:rPr lang="fi-FI" dirty="0"/>
-              <a:t> </a:t>
-            </a:r>
-            <a:r>
-              <a:rPr lang="fi-FI" dirty="0" err="1"/>
-              <a:t>then</a:t>
-            </a:r>
-            <a:r>
-              <a:rPr lang="fi-FI" dirty="0"/>
-              <a:t> it </a:t>
-            </a:r>
-            <a:r>
-              <a:rPr lang="fi-FI" dirty="0" err="1"/>
-              <a:t>would</a:t>
-            </a:r>
-            <a:r>
-              <a:rPr lang="fi-FI" dirty="0"/>
-              <a:t> </a:t>
-            </a:r>
-            <a:r>
-              <a:rPr lang="fi-FI" dirty="0" err="1"/>
-              <a:t>probably</a:t>
-            </a:r>
-            <a:r>
-              <a:rPr lang="fi-FI" dirty="0"/>
-              <a:t> </a:t>
-            </a:r>
-            <a:r>
-              <a:rPr lang="fi-FI" dirty="0" err="1"/>
-              <a:t>fail</a:t>
-            </a:r>
-            <a:r>
-              <a:rPr lang="fi-FI" dirty="0"/>
-              <a:t> to </a:t>
-            </a:r>
-            <a:r>
-              <a:rPr lang="fi-FI" dirty="0" err="1"/>
-              <a:t>be</a:t>
-            </a:r>
-            <a:r>
-              <a:rPr lang="fi-FI" dirty="0"/>
-              <a:t> as </a:t>
-            </a:r>
-            <a:r>
-              <a:rPr lang="fi-FI" dirty="0" err="1"/>
-              <a:t>close</a:t>
-            </a:r>
-            <a:r>
-              <a:rPr lang="fi-FI" dirty="0"/>
-              <a:t> to </a:t>
-            </a:r>
-            <a:r>
-              <a:rPr lang="fi-FI" dirty="0" err="1"/>
-              <a:t>random</a:t>
-            </a:r>
-            <a:r>
-              <a:rPr lang="fi-FI" dirty="0"/>
-              <a:t> as </a:t>
-            </a:r>
-            <a:r>
-              <a:rPr lang="fi-FI" dirty="0" err="1"/>
-              <a:t>the</a:t>
-            </a:r>
-            <a:r>
-              <a:rPr lang="fi-FI" dirty="0"/>
-              <a:t> </a:t>
-            </a:r>
-            <a:r>
-              <a:rPr lang="fi-FI" dirty="0" err="1"/>
-              <a:t>ones</a:t>
-            </a:r>
-            <a:r>
-              <a:rPr lang="fi-FI" dirty="0"/>
-              <a:t> </a:t>
-            </a:r>
-            <a:r>
-              <a:rPr lang="fi-FI" dirty="0" err="1"/>
-              <a:t>we</a:t>
-            </a:r>
-            <a:r>
-              <a:rPr lang="fi-FI" dirty="0"/>
-              <a:t> </a:t>
-            </a:r>
-            <a:r>
-              <a:rPr lang="fi-FI" dirty="0" err="1"/>
-              <a:t>get</a:t>
-            </a:r>
-            <a:r>
-              <a:rPr lang="fi-FI" dirty="0"/>
-              <a:t> </a:t>
-            </a:r>
-            <a:r>
-              <a:rPr lang="fi-FI" dirty="0" err="1"/>
-              <a:t>from</a:t>
-            </a:r>
-            <a:r>
-              <a:rPr lang="fi-FI" dirty="0"/>
-              <a:t> </a:t>
-            </a:r>
-            <a:r>
-              <a:rPr lang="fi-FI" dirty="0" err="1"/>
-              <a:t>established</a:t>
-            </a:r>
-            <a:r>
-              <a:rPr lang="fi-FI" dirty="0"/>
-              <a:t> </a:t>
-            </a:r>
-            <a:r>
-              <a:rPr lang="fi-FI" dirty="0" err="1"/>
-              <a:t>libraries</a:t>
-            </a:r>
-            <a:r>
-              <a:rPr lang="fi-FI" dirty="0"/>
-              <a:t>. </a:t>
-            </a:r>
-          </a:p>
-          <a:p>
-            <a:r>
-              <a:rPr lang="fi-FI" dirty="0" err="1"/>
-              <a:t>So</a:t>
-            </a:r>
-            <a:r>
-              <a:rPr lang="fi-FI" dirty="0"/>
-              <a:t> </a:t>
-            </a:r>
-            <a:r>
-              <a:rPr lang="fi-FI" dirty="0" err="1"/>
-              <a:t>let’s</a:t>
-            </a:r>
-            <a:r>
-              <a:rPr lang="fi-FI" dirty="0"/>
-              <a:t> just </a:t>
-            </a:r>
-            <a:r>
-              <a:rPr lang="fi-FI" dirty="0" err="1"/>
-              <a:t>use</a:t>
-            </a:r>
-            <a:r>
-              <a:rPr lang="fi-FI" dirty="0"/>
-              <a:t> </a:t>
-            </a:r>
-            <a:r>
-              <a:rPr lang="fi-FI" dirty="0" err="1"/>
-              <a:t>those</a:t>
-            </a:r>
-            <a:r>
-              <a:rPr lang="fi-FI" dirty="0"/>
-              <a:t> </a:t>
-            </a:r>
-            <a:r>
-              <a:rPr lang="fi-FI" dirty="0" err="1"/>
-              <a:t>from</a:t>
-            </a:r>
-            <a:r>
-              <a:rPr lang="fi-FI" dirty="0"/>
-              <a:t> </a:t>
-            </a:r>
-            <a:r>
-              <a:rPr lang="fi-FI" dirty="0" err="1"/>
-              <a:t>libraries</a:t>
-            </a:r>
-            <a:r>
-              <a:rPr lang="fi-FI" dirty="0"/>
-              <a:t>.</a:t>
+              <a:rPr lang="en-US" dirty="0"/>
+              <a:t>And even then it would probably fail to be as close to random as the ones we get from established libraries. </a:t>
+            </a:r>
+          </a:p>
+          <a:p>
+            <a:r>
+              <a:rPr lang="en-US" dirty="0"/>
+              <a:t>So let’s just use those pseudo-random generators from libraries.</a:t>
             </a:r>
           </a:p>
           <a:p>
             <a:pPr lvl="1"/>
             <a:r>
-              <a:rPr lang="fi-FI" dirty="0"/>
-              <a:t>Even </a:t>
-            </a:r>
-            <a:r>
-              <a:rPr lang="fi-FI" dirty="0" err="1"/>
-              <a:t>they</a:t>
-            </a:r>
-            <a:r>
-              <a:rPr lang="fi-FI" dirty="0"/>
-              <a:t> </a:t>
-            </a:r>
-            <a:r>
-              <a:rPr lang="fi-FI" dirty="0" err="1"/>
-              <a:t>are</a:t>
-            </a:r>
-            <a:r>
-              <a:rPr lang="fi-FI" dirty="0"/>
-              <a:t> </a:t>
-            </a:r>
-            <a:r>
-              <a:rPr lang="fi-FI" dirty="0" err="1"/>
-              <a:t>faulty</a:t>
-            </a:r>
-            <a:r>
-              <a:rPr lang="fi-FI" dirty="0"/>
-              <a:t> </a:t>
-            </a:r>
-            <a:r>
-              <a:rPr lang="fi-FI" dirty="0" err="1"/>
-              <a:t>if</a:t>
-            </a:r>
-            <a:r>
-              <a:rPr lang="fi-FI" dirty="0"/>
-              <a:t> </a:t>
-            </a:r>
-            <a:r>
-              <a:rPr lang="fi-FI" dirty="0" err="1"/>
-              <a:t>computers</a:t>
-            </a:r>
-            <a:r>
-              <a:rPr lang="fi-FI" dirty="0"/>
-              <a:t> </a:t>
-            </a:r>
-            <a:r>
-              <a:rPr lang="fi-FI" dirty="0" err="1"/>
-              <a:t>are</a:t>
-            </a:r>
-            <a:r>
-              <a:rPr lang="fi-FI" dirty="0"/>
-              <a:t> </a:t>
-            </a:r>
-            <a:r>
-              <a:rPr lang="fi-FI" dirty="0" err="1"/>
-              <a:t>so</a:t>
-            </a:r>
-            <a:r>
-              <a:rPr lang="fi-FI" dirty="0"/>
-              <a:t> </a:t>
-            </a:r>
-            <a:r>
-              <a:rPr lang="fi-FI" dirty="0" err="1"/>
-              <a:t>fast</a:t>
-            </a:r>
-            <a:r>
-              <a:rPr lang="fi-FI" dirty="0"/>
-              <a:t> </a:t>
-            </a:r>
-            <a:r>
-              <a:rPr lang="fi-FI" dirty="0" err="1"/>
-              <a:t>that</a:t>
-            </a:r>
-            <a:r>
-              <a:rPr lang="fi-FI" dirty="0"/>
-              <a:t> </a:t>
-            </a:r>
-            <a:r>
-              <a:rPr lang="fi-FI" dirty="0" err="1"/>
-              <a:t>random</a:t>
-            </a:r>
-            <a:r>
-              <a:rPr lang="fi-FI" dirty="0"/>
-              <a:t> </a:t>
-            </a:r>
-            <a:r>
-              <a:rPr lang="fi-FI" dirty="0" err="1"/>
-              <a:t>values</a:t>
-            </a:r>
-            <a:r>
-              <a:rPr lang="fi-FI" dirty="0"/>
-              <a:t> </a:t>
-            </a:r>
-            <a:r>
-              <a:rPr lang="fi-FI" dirty="0" err="1"/>
-              <a:t>get</a:t>
-            </a:r>
-            <a:r>
-              <a:rPr lang="fi-FI" dirty="0"/>
-              <a:t> </a:t>
-            </a:r>
-            <a:r>
-              <a:rPr lang="fi-FI" dirty="0" err="1"/>
-              <a:t>the</a:t>
-            </a:r>
-            <a:r>
-              <a:rPr lang="fi-FI" dirty="0"/>
-              <a:t> </a:t>
-            </a:r>
-            <a:r>
-              <a:rPr lang="fi-FI" dirty="0" err="1"/>
-              <a:t>same</a:t>
-            </a:r>
-            <a:r>
-              <a:rPr lang="fi-FI" dirty="0"/>
-              <a:t> </a:t>
-            </a:r>
-            <a:r>
-              <a:rPr lang="fi-FI" dirty="0" err="1"/>
-              <a:t>computer</a:t>
-            </a:r>
-            <a:r>
-              <a:rPr lang="fi-FI" dirty="0"/>
-              <a:t> </a:t>
-            </a:r>
-            <a:r>
-              <a:rPr lang="fi-FI" dirty="0" err="1"/>
-              <a:t>time</a:t>
-            </a:r>
-            <a:r>
-              <a:rPr lang="fi-FI" dirty="0"/>
-              <a:t> </a:t>
-            </a:r>
-            <a:r>
-              <a:rPr lang="fi-FI" dirty="0" err="1"/>
-              <a:t>based</a:t>
-            </a:r>
-            <a:r>
-              <a:rPr lang="fi-FI" dirty="0"/>
-              <a:t> </a:t>
-            </a:r>
-            <a:r>
-              <a:rPr lang="fi-FI" dirty="0" err="1"/>
-              <a:t>seed</a:t>
-            </a:r>
-            <a:r>
-              <a:rPr lang="fi-FI" dirty="0"/>
-              <a:t> </a:t>
+              <a:rPr lang="en-US" dirty="0"/>
+              <a:t>Even they are faulty as computers are often so fast that random generator gets same system time based seed </a:t>
             </a:r>
           </a:p>
           <a:p>
             <a:pPr lvl="2"/>
             <a:r>
-              <a:rPr lang="fi-FI" dirty="0" err="1"/>
-              <a:t>like</a:t>
-            </a:r>
-            <a:r>
-              <a:rPr lang="fi-FI" dirty="0"/>
-              <a:t> </a:t>
-            </a:r>
-            <a:r>
-              <a:rPr lang="fi-FI" dirty="0" err="1"/>
-              <a:t>we</a:t>
-            </a:r>
-            <a:r>
-              <a:rPr lang="fi-FI" dirty="0"/>
-              <a:t> </a:t>
-            </a:r>
-            <a:r>
-              <a:rPr lang="fi-FI" dirty="0" err="1"/>
-              <a:t>have</a:t>
-            </a:r>
-            <a:r>
-              <a:rPr lang="fi-FI" dirty="0"/>
-              <a:t> </a:t>
-            </a:r>
-            <a:r>
-              <a:rPr lang="fi-FI" dirty="0" err="1"/>
-              <a:t>seen</a:t>
-            </a:r>
-            <a:r>
-              <a:rPr lang="fi-FI" dirty="0"/>
-              <a:t> </a:t>
-            </a:r>
-            <a:r>
-              <a:rPr lang="fi-FI" dirty="0" err="1"/>
-              <a:t>before</a:t>
-            </a:r>
-            <a:r>
-              <a:rPr lang="fi-FI" dirty="0"/>
-              <a:t> in </a:t>
-            </a:r>
-            <a:r>
-              <a:rPr lang="fi-FI" dirty="0" err="1"/>
-              <a:t>programming</a:t>
-            </a:r>
-            <a:r>
-              <a:rPr lang="fi-FI" dirty="0"/>
-              <a:t>. </a:t>
+              <a:rPr lang="en-US" dirty="0"/>
+              <a:t>Like we have seen before on 1</a:t>
+            </a:r>
+            <a:r>
+              <a:rPr lang="en-US" baseline="30000" dirty="0"/>
+              <a:t>st</a:t>
+            </a:r>
+            <a:r>
+              <a:rPr lang="en-US" dirty="0"/>
+              <a:t> 2</a:t>
+            </a:r>
+            <a:r>
+              <a:rPr lang="en-US" baseline="30000" dirty="0"/>
+              <a:t>nd</a:t>
+            </a:r>
+            <a:r>
+              <a:rPr lang="en-US" dirty="0"/>
+              <a:t> semester programming courses. </a:t>
             </a:r>
           </a:p>
           <a:p>
             <a:pPr lvl="2"/>
             <a:r>
-              <a:rPr lang="fi-FI" dirty="0" err="1"/>
-              <a:t>We</a:t>
-            </a:r>
-            <a:r>
-              <a:rPr lang="fi-FI" dirty="0"/>
-              <a:t> </a:t>
-            </a:r>
-            <a:r>
-              <a:rPr lang="fi-FI" dirty="0" err="1"/>
-              <a:t>might</a:t>
-            </a:r>
-            <a:r>
-              <a:rPr lang="fi-FI" dirty="0"/>
-              <a:t> </a:t>
-            </a:r>
-            <a:r>
-              <a:rPr lang="fi-FI" dirty="0" err="1"/>
-              <a:t>get</a:t>
-            </a:r>
-            <a:r>
-              <a:rPr lang="fi-FI" dirty="0"/>
-              <a:t> </a:t>
-            </a:r>
-            <a:r>
-              <a:rPr lang="fi-FI" dirty="0" err="1"/>
-              <a:t>numerous</a:t>
-            </a:r>
-            <a:r>
-              <a:rPr lang="fi-FI" dirty="0"/>
-              <a:t> </a:t>
-            </a:r>
-            <a:r>
-              <a:rPr lang="fi-FI" dirty="0" err="1"/>
-              <a:t>same</a:t>
-            </a:r>
-            <a:r>
-              <a:rPr lang="fi-FI" dirty="0"/>
-              <a:t> </a:t>
-            </a:r>
-            <a:r>
-              <a:rPr lang="fi-FI" dirty="0" err="1"/>
-              <a:t>values</a:t>
-            </a:r>
-            <a:r>
-              <a:rPr lang="fi-FI" dirty="0"/>
-              <a:t> in </a:t>
-            </a:r>
-            <a:r>
-              <a:rPr lang="fi-FI" dirty="0" err="1"/>
-              <a:t>row</a:t>
-            </a:r>
-            <a:r>
-              <a:rPr lang="fi-FI" dirty="0"/>
-              <a:t> </a:t>
-            </a:r>
-            <a:r>
-              <a:rPr lang="fi-FI" dirty="0" err="1"/>
-              <a:t>or</a:t>
-            </a:r>
-            <a:r>
-              <a:rPr lang="fi-FI" dirty="0"/>
-              <a:t> </a:t>
-            </a:r>
-            <a:r>
-              <a:rPr lang="fi-FI" dirty="0" err="1"/>
-              <a:t>other</a:t>
-            </a:r>
-            <a:r>
-              <a:rPr lang="fi-FI" dirty="0"/>
-              <a:t> </a:t>
-            </a:r>
-            <a:r>
-              <a:rPr lang="fi-FI" dirty="0" err="1"/>
-              <a:t>kind</a:t>
-            </a:r>
-            <a:r>
-              <a:rPr lang="fi-FI" dirty="0"/>
-              <a:t> of </a:t>
-            </a:r>
-            <a:r>
-              <a:rPr lang="fi-FI" dirty="0" err="1"/>
-              <a:t>unwanted</a:t>
-            </a:r>
-            <a:r>
-              <a:rPr lang="fi-FI" dirty="0"/>
-              <a:t> non-</a:t>
-            </a:r>
-            <a:r>
-              <a:rPr lang="fi-FI" dirty="0" err="1"/>
-              <a:t>random</a:t>
-            </a:r>
-            <a:r>
-              <a:rPr lang="fi-FI" dirty="0"/>
-              <a:t> </a:t>
-            </a:r>
-            <a:r>
-              <a:rPr lang="fi-FI" dirty="0" err="1"/>
-              <a:t>patterns</a:t>
-            </a:r>
-            <a:r>
-              <a:rPr lang="fi-FI" dirty="0"/>
-              <a:t>.</a:t>
+              <a:rPr lang="en-US" dirty="0"/>
+              <a:t>We might get numerous identical values in row or other kind of unwanted non-random patterns.</a:t>
             </a:r>
           </a:p>
           <a:p>
             <a:pPr lvl="1"/>
             <a:r>
-              <a:rPr lang="fi-FI" dirty="0" err="1"/>
-              <a:t>Basically</a:t>
-            </a:r>
-            <a:r>
-              <a:rPr lang="fi-FI" dirty="0"/>
-              <a:t> </a:t>
-            </a:r>
-            <a:r>
-              <a:rPr lang="fi-FI" dirty="0" err="1"/>
-              <a:t>we</a:t>
-            </a:r>
-            <a:r>
-              <a:rPr lang="fi-FI" dirty="0"/>
-              <a:t> </a:t>
-            </a:r>
-            <a:r>
-              <a:rPr lang="fi-FI" dirty="0" err="1"/>
-              <a:t>would</a:t>
-            </a:r>
-            <a:r>
-              <a:rPr lang="fi-FI" dirty="0"/>
-              <a:t> </a:t>
-            </a:r>
-            <a:r>
-              <a:rPr lang="fi-FI" dirty="0" err="1"/>
-              <a:t>need</a:t>
-            </a:r>
-            <a:r>
-              <a:rPr lang="fi-FI" dirty="0"/>
-              <a:t> to </a:t>
-            </a:r>
-            <a:r>
-              <a:rPr lang="fi-FI" dirty="0" err="1"/>
-              <a:t>create</a:t>
-            </a:r>
-            <a:r>
-              <a:rPr lang="fi-FI" dirty="0"/>
-              <a:t> a single </a:t>
-            </a:r>
-            <a:r>
-              <a:rPr lang="fi-FI" dirty="0" err="1"/>
-              <a:t>random</a:t>
-            </a:r>
-            <a:r>
-              <a:rPr lang="fi-FI" dirty="0"/>
-              <a:t> </a:t>
-            </a:r>
-            <a:r>
-              <a:rPr lang="fi-FI" dirty="0" err="1"/>
-              <a:t>generator</a:t>
-            </a:r>
-            <a:r>
-              <a:rPr lang="fi-FI" dirty="0"/>
-              <a:t>, and </a:t>
-            </a:r>
-            <a:r>
-              <a:rPr lang="fi-FI" dirty="0" err="1"/>
-              <a:t>continue</a:t>
-            </a:r>
-            <a:r>
-              <a:rPr lang="fi-FI" dirty="0"/>
-              <a:t> to </a:t>
-            </a:r>
-            <a:r>
-              <a:rPr lang="fi-FI" dirty="0" err="1"/>
-              <a:t>ask</a:t>
-            </a:r>
-            <a:r>
-              <a:rPr lang="fi-FI" dirty="0"/>
-              <a:t> </a:t>
-            </a:r>
-            <a:r>
-              <a:rPr lang="fi-FI" dirty="0" err="1"/>
-              <a:t>more</a:t>
-            </a:r>
-            <a:r>
-              <a:rPr lang="fi-FI" dirty="0"/>
-              <a:t> </a:t>
-            </a:r>
-            <a:r>
-              <a:rPr lang="fi-FI" dirty="0" err="1"/>
-              <a:t>randomized</a:t>
-            </a:r>
-            <a:r>
-              <a:rPr lang="fi-FI" dirty="0"/>
-              <a:t> </a:t>
-            </a:r>
-            <a:r>
-              <a:rPr lang="fi-FI" dirty="0" err="1"/>
-              <a:t>values</a:t>
-            </a:r>
-            <a:r>
-              <a:rPr lang="fi-FI" dirty="0"/>
-              <a:t> </a:t>
-            </a:r>
-            <a:r>
-              <a:rPr lang="fi-FI" dirty="0" err="1"/>
-              <a:t>from</a:t>
-            </a:r>
-            <a:r>
-              <a:rPr lang="fi-FI" dirty="0"/>
-              <a:t> </a:t>
-            </a:r>
-            <a:r>
-              <a:rPr lang="fi-FI" dirty="0" err="1"/>
-              <a:t>the</a:t>
-            </a:r>
-            <a:r>
-              <a:rPr lang="fi-FI" dirty="0"/>
-              <a:t> </a:t>
-            </a:r>
-            <a:r>
-              <a:rPr lang="fi-FI" dirty="0" err="1"/>
-              <a:t>same</a:t>
-            </a:r>
-            <a:r>
-              <a:rPr lang="fi-FI" dirty="0"/>
-              <a:t> </a:t>
-            </a:r>
-            <a:r>
-              <a:rPr lang="fi-FI" dirty="0" err="1"/>
-              <a:t>generator</a:t>
-            </a:r>
-            <a:r>
-              <a:rPr lang="fi-FI" dirty="0"/>
-              <a:t> to </a:t>
-            </a:r>
-            <a:r>
-              <a:rPr lang="fi-FI" dirty="0" err="1"/>
-              <a:t>get</a:t>
-            </a:r>
-            <a:r>
-              <a:rPr lang="fi-FI" dirty="0"/>
-              <a:t> </a:t>
-            </a:r>
-            <a:r>
-              <a:rPr lang="fi-FI" dirty="0" err="1"/>
-              <a:t>more</a:t>
-            </a:r>
-            <a:r>
-              <a:rPr lang="fi-FI" dirty="0"/>
-              <a:t> </a:t>
-            </a:r>
-            <a:r>
-              <a:rPr lang="fi-FI" dirty="0" err="1"/>
-              <a:t>real</a:t>
-            </a:r>
-            <a:r>
-              <a:rPr lang="fi-FI" dirty="0"/>
-              <a:t> </a:t>
-            </a:r>
-            <a:r>
-              <a:rPr lang="fi-FI" dirty="0" err="1"/>
-              <a:t>pseudo</a:t>
-            </a:r>
-            <a:r>
-              <a:rPr lang="fi-FI" dirty="0"/>
-              <a:t> </a:t>
-            </a:r>
-            <a:r>
-              <a:rPr lang="fi-FI" dirty="0" err="1"/>
-              <a:t>random</a:t>
-            </a:r>
-            <a:r>
-              <a:rPr lang="fi-FI" dirty="0"/>
-              <a:t> </a:t>
-            </a:r>
-            <a:r>
-              <a:rPr lang="fi-FI" dirty="0" err="1"/>
-              <a:t>values</a:t>
-            </a:r>
-            <a:endParaRPr lang="fi-FI" dirty="0"/>
+              <a:rPr lang="en-US" dirty="0"/>
+              <a:t>Basically we would need to create a single random generator, and continue to ask more randomized values from the </a:t>
+            </a:r>
+            <a:r>
+              <a:rPr lang="en-US" u="sng" dirty="0"/>
+              <a:t>same generator</a:t>
+            </a:r>
+            <a:r>
+              <a:rPr lang="en-US" dirty="0"/>
+              <a:t> to get more real pseudo random values</a:t>
+            </a:r>
           </a:p>
           <a:p>
             <a:pPr lvl="1"/>
             <a:r>
-              <a:rPr lang="fi-FI" dirty="0"/>
-              <a:t>(</a:t>
-            </a:r>
-            <a:r>
-              <a:rPr lang="fi-FI" dirty="0" err="1"/>
-              <a:t>or</a:t>
-            </a:r>
-            <a:r>
-              <a:rPr lang="fi-FI" dirty="0"/>
-              <a:t> </a:t>
-            </a:r>
-            <a:r>
-              <a:rPr lang="fi-FI" dirty="0" err="1"/>
-              <a:t>make</a:t>
-            </a:r>
-            <a:r>
-              <a:rPr lang="fi-FI" dirty="0"/>
-              <a:t> </a:t>
-            </a:r>
-            <a:r>
-              <a:rPr lang="fi-FI" dirty="0" err="1"/>
-              <a:t>the</a:t>
-            </a:r>
-            <a:r>
-              <a:rPr lang="fi-FI" dirty="0"/>
-              <a:t> </a:t>
-            </a:r>
-            <a:r>
-              <a:rPr lang="fi-FI" dirty="0" err="1"/>
-              <a:t>system</a:t>
-            </a:r>
-            <a:r>
-              <a:rPr lang="fi-FI" dirty="0"/>
-              <a:t> </a:t>
-            </a:r>
-            <a:r>
-              <a:rPr lang="fi-FI" dirty="0" err="1"/>
-              <a:t>time</a:t>
-            </a:r>
-            <a:r>
-              <a:rPr lang="fi-FI" dirty="0"/>
-              <a:t> </a:t>
-            </a:r>
-            <a:r>
-              <a:rPr lang="fi-FI" dirty="0" err="1"/>
-              <a:t>change</a:t>
-            </a:r>
-            <a:r>
-              <a:rPr lang="fi-FI" dirty="0"/>
-              <a:t> </a:t>
-            </a:r>
-            <a:r>
-              <a:rPr lang="fi-FI" dirty="0" err="1"/>
-              <a:t>by</a:t>
-            </a:r>
-            <a:r>
-              <a:rPr lang="fi-FI" dirty="0"/>
-              <a:t> </a:t>
-            </a:r>
-            <a:r>
-              <a:rPr lang="fi-FI" dirty="0" err="1"/>
-              <a:t>adding</a:t>
-            </a:r>
-            <a:r>
-              <a:rPr lang="fi-FI" dirty="0"/>
-              <a:t> </a:t>
-            </a:r>
-            <a:r>
-              <a:rPr lang="fi-FI" dirty="0" err="1"/>
-              <a:t>so</a:t>
-            </a:r>
-            <a:r>
-              <a:rPr lang="fi-FI" dirty="0"/>
-              <a:t> </a:t>
-            </a:r>
-            <a:r>
-              <a:rPr lang="fi-FI" dirty="0" err="1"/>
-              <a:t>much</a:t>
-            </a:r>
-            <a:r>
-              <a:rPr lang="fi-FI" dirty="0"/>
-              <a:t> </a:t>
-            </a:r>
-            <a:r>
-              <a:rPr lang="fi-FI" dirty="0" err="1"/>
-              <a:t>delay</a:t>
-            </a:r>
-            <a:r>
-              <a:rPr lang="fi-FI" dirty="0"/>
-              <a:t> </a:t>
-            </a:r>
-            <a:r>
-              <a:rPr lang="fi-FI" dirty="0" err="1"/>
-              <a:t>that</a:t>
-            </a:r>
-            <a:r>
-              <a:rPr lang="fi-FI" dirty="0"/>
-              <a:t> </a:t>
-            </a:r>
-            <a:r>
-              <a:rPr lang="fi-FI" dirty="0" err="1"/>
-              <a:t>the</a:t>
-            </a:r>
-            <a:r>
-              <a:rPr lang="fi-FI" dirty="0"/>
-              <a:t> </a:t>
-            </a:r>
-            <a:r>
-              <a:rPr lang="fi-FI" dirty="0" err="1"/>
-              <a:t>used</a:t>
-            </a:r>
-            <a:r>
-              <a:rPr lang="fi-FI" dirty="0"/>
-              <a:t> </a:t>
-            </a:r>
-            <a:r>
-              <a:rPr lang="fi-FI" dirty="0" err="1"/>
-              <a:t>seed</a:t>
-            </a:r>
-            <a:r>
-              <a:rPr lang="fi-FI" dirty="0"/>
-              <a:t> </a:t>
-            </a:r>
-            <a:r>
-              <a:rPr lang="fi-FI" dirty="0" err="1"/>
-              <a:t>changes</a:t>
-            </a:r>
-            <a:r>
-              <a:rPr lang="fi-FI" dirty="0"/>
-              <a:t>, </a:t>
-            </a:r>
-            <a:r>
-              <a:rPr lang="fi-FI" dirty="0" err="1"/>
-              <a:t>but</a:t>
-            </a:r>
-            <a:r>
-              <a:rPr lang="fi-FI" dirty="0"/>
-              <a:t> </a:t>
-            </a:r>
-            <a:r>
-              <a:rPr lang="fi-FI" dirty="0" err="1"/>
-              <a:t>that’s</a:t>
-            </a:r>
-            <a:r>
-              <a:rPr lang="fi-FI" dirty="0"/>
-              <a:t> us ’</a:t>
-            </a:r>
-            <a:r>
-              <a:rPr lang="fi-FI" dirty="0" err="1"/>
-              <a:t>doctoring</a:t>
-            </a:r>
-            <a:r>
-              <a:rPr lang="fi-FI" dirty="0"/>
-              <a:t>’ </a:t>
-            </a:r>
-            <a:r>
-              <a:rPr lang="fi-FI" dirty="0" err="1"/>
-              <a:t>again</a:t>
-            </a:r>
-            <a:r>
-              <a:rPr lang="fi-FI" dirty="0"/>
-              <a:t>, </a:t>
-            </a:r>
-            <a:r>
-              <a:rPr lang="fi-FI" dirty="0" err="1"/>
-              <a:t>so</a:t>
-            </a:r>
-            <a:r>
-              <a:rPr lang="fi-FI" dirty="0"/>
-              <a:t> </a:t>
-            </a:r>
-            <a:r>
-              <a:rPr lang="fi-FI" dirty="0" err="1"/>
-              <a:t>not</a:t>
-            </a:r>
-            <a:r>
-              <a:rPr lang="fi-FI" dirty="0"/>
-              <a:t> </a:t>
-            </a:r>
-            <a:r>
-              <a:rPr lang="fi-FI" dirty="0" err="1"/>
-              <a:t>good</a:t>
-            </a:r>
-            <a:r>
-              <a:rPr lang="fi-FI" dirty="0"/>
-              <a:t> …)</a:t>
+              <a:rPr lang="en-US" dirty="0"/>
+              <a:t>(or make the system time change by adding so much delay that the used seed changes, but that’s us ’doctoring’ the randomization again …)</a:t>
             </a:r>
           </a:p>
           <a:p>
             <a:pPr lvl="1"/>
             <a:r>
-              <a:rPr lang="fi-FI" dirty="0"/>
-              <a:t>Of </a:t>
-            </a:r>
-            <a:r>
-              <a:rPr lang="fi-FI" dirty="0" err="1"/>
-              <a:t>course</a:t>
-            </a:r>
-            <a:r>
-              <a:rPr lang="fi-FI" dirty="0"/>
-              <a:t> </a:t>
-            </a:r>
-            <a:r>
-              <a:rPr lang="fi-FI" dirty="0" err="1"/>
-              <a:t>if</a:t>
-            </a:r>
-            <a:r>
-              <a:rPr lang="fi-FI" dirty="0"/>
-              <a:t> </a:t>
-            </a:r>
-            <a:r>
-              <a:rPr lang="fi-FI" dirty="0" err="1"/>
-              <a:t>we</a:t>
-            </a:r>
-            <a:r>
-              <a:rPr lang="fi-FI" dirty="0"/>
-              <a:t> </a:t>
-            </a:r>
-            <a:r>
-              <a:rPr lang="fi-FI" dirty="0" err="1"/>
-              <a:t>are</a:t>
-            </a:r>
-            <a:r>
-              <a:rPr lang="fi-FI" dirty="0"/>
-              <a:t> just </a:t>
-            </a:r>
-            <a:r>
-              <a:rPr lang="fi-FI" dirty="0" err="1"/>
-              <a:t>creating</a:t>
-            </a:r>
-            <a:r>
-              <a:rPr lang="fi-FI" dirty="0"/>
-              <a:t> some </a:t>
-            </a:r>
-            <a:r>
-              <a:rPr lang="fi-FI" dirty="0" err="1"/>
-              <a:t>funny</a:t>
-            </a:r>
-            <a:r>
-              <a:rPr lang="fi-FI" dirty="0"/>
-              <a:t> </a:t>
-            </a:r>
-            <a:r>
-              <a:rPr lang="fi-FI" dirty="0" err="1"/>
-              <a:t>test</a:t>
-            </a:r>
-            <a:r>
-              <a:rPr lang="fi-FI" dirty="0"/>
-              <a:t> </a:t>
-            </a:r>
-            <a:r>
-              <a:rPr lang="fi-FI" dirty="0" err="1"/>
-              <a:t>values</a:t>
-            </a:r>
-            <a:r>
-              <a:rPr lang="fi-FI" dirty="0"/>
-              <a:t> for an </a:t>
-            </a:r>
-            <a:r>
-              <a:rPr lang="fi-FI" dirty="0" err="1"/>
-              <a:t>app</a:t>
-            </a:r>
-            <a:r>
-              <a:rPr lang="fi-FI" dirty="0"/>
-              <a:t> </a:t>
-            </a:r>
-            <a:r>
-              <a:rPr lang="fi-FI" dirty="0" err="1"/>
-              <a:t>we</a:t>
-            </a:r>
-            <a:r>
-              <a:rPr lang="fi-FI" dirty="0"/>
-              <a:t> </a:t>
-            </a:r>
-            <a:r>
-              <a:rPr lang="fi-FI" dirty="0" err="1"/>
-              <a:t>can</a:t>
-            </a:r>
-            <a:r>
-              <a:rPr lang="fi-FI" dirty="0"/>
-              <a:t> </a:t>
-            </a:r>
-            <a:r>
-              <a:rPr lang="fi-FI" dirty="0" err="1"/>
-              <a:t>accept</a:t>
-            </a:r>
-            <a:r>
-              <a:rPr lang="fi-FI" dirty="0"/>
-              <a:t> non-</a:t>
-            </a:r>
-            <a:r>
-              <a:rPr lang="fi-FI" dirty="0" err="1"/>
-              <a:t>fully</a:t>
-            </a:r>
-            <a:r>
-              <a:rPr lang="fi-FI" dirty="0"/>
-              <a:t> </a:t>
-            </a:r>
-            <a:r>
-              <a:rPr lang="fi-FI" dirty="0" err="1"/>
-              <a:t>random</a:t>
-            </a:r>
-            <a:r>
-              <a:rPr lang="fi-FI" dirty="0"/>
-              <a:t> </a:t>
-            </a:r>
-            <a:r>
-              <a:rPr lang="fi-FI" dirty="0" err="1"/>
-              <a:t>values</a:t>
-            </a:r>
-            <a:r>
-              <a:rPr lang="fi-FI" dirty="0"/>
-              <a:t> </a:t>
-            </a:r>
+              <a:rPr lang="en-US" dirty="0"/>
+              <a:t>Of course if we are just creating some trivial test values for an app. </a:t>
+            </a:r>
+            <a:r>
+              <a:rPr lang="en-US"/>
+              <a:t>We may </a:t>
+            </a:r>
+            <a:r>
+              <a:rPr lang="en-US" dirty="0"/>
+              <a:t>accept non-fully </a:t>
+            </a:r>
+            <a:r>
+              <a:rPr lang="en-US"/>
+              <a:t>random values.</a:t>
+            </a:r>
+            <a:endParaRPr lang="en-US" dirty="0"/>
           </a:p>
         </p:txBody>
       </p:sp>
@@ -10799,7 +9961,7 @@
           <a:p>
             <a:fld id="{202E1EC2-47B8-044B-A09E-6A63B4D80C87}" type="datetime1">
               <a:rPr lang="fi-FI" smtClean="0"/>
-              <a:t>27.10.2022</a:t>
+              <a:t>30.10.2022</a:t>
             </a:fld>
             <a:endParaRPr lang="en-GB"/>
           </a:p>
@@ -11429,15 +10591,6 @@
 </file>
 
 <file path=customXml/item1.xml><?xml version="1.0" encoding="utf-8"?>
-<?mso-contentType ?>
-<FormTemplates xmlns="http://schemas.microsoft.com/sharepoint/v3/contenttype/forms">
-  <Display>DocumentLibraryForm</Display>
-  <Edit>DocumentLibraryForm</Edit>
-  <New>DocumentLibraryForm</New>
-</FormTemplates>
-</file>
-
-<file path=customXml/item2.xml><?xml version="1.0" encoding="utf-8"?>
 <ct:contentTypeSchema xmlns:ct="http://schemas.microsoft.com/office/2006/metadata/contentType" xmlns:ma="http://schemas.microsoft.com/office/2006/metadata/properties/metaAttributes" ct:_="" ma:_="" ma:contentTypeName="Document" ma:contentTypeID="0x01010024C55B41993A414DABB8DD07ACBA0814" ma:contentTypeVersion="1" ma:contentTypeDescription="Create a new document." ma:contentTypeScope="" ma:versionID="3ea0c22b5866975a7b271665de4056c5">
   <xsd:schema xmlns:xsd="http://www.w3.org/2001/XMLSchema" xmlns:xs="http://www.w3.org/2001/XMLSchema" xmlns:p="http://schemas.microsoft.com/office/2006/metadata/properties" xmlns:ns1="http://schemas.microsoft.com/sharepoint/v3" targetNamespace="http://schemas.microsoft.com/office/2006/metadata/properties" ma:root="true" ma:fieldsID="ef2aa9ed40e72a78c3822fc753b43e87" ns1:_="">
     <xsd:import namespace="http://schemas.microsoft.com/sharepoint/v3"/>
@@ -11569,6 +10722,15 @@
 </ct:contentTypeSchema>
 </file>
 
+<file path=customXml/item2.xml><?xml version="1.0" encoding="utf-8"?>
+<?mso-contentType ?>
+<FormTemplates xmlns="http://schemas.microsoft.com/sharepoint/v3/contenttype/forms">
+  <Display>DocumentLibraryForm</Display>
+  <Edit>DocumentLibraryForm</Edit>
+  <New>DocumentLibraryForm</New>
+</FormTemplates>
+</file>
+
 <file path=customXml/item3.xml><?xml version="1.0" encoding="utf-8"?>
 <p:properties xmlns:p="http://schemas.microsoft.com/office/2006/metadata/properties" xmlns:xsi="http://www.w3.org/2001/XMLSchema-instance" xmlns:pc="http://schemas.microsoft.com/office/infopath/2007/PartnerControls">
   <documentManagement>
@@ -11579,14 +10741,6 @@
 </file>
 
 <file path=customXml/itemProps1.xml><?xml version="1.0" encoding="utf-8"?>
-<ds:datastoreItem xmlns:ds="http://schemas.openxmlformats.org/officeDocument/2006/customXml" ds:itemID="{D546C03B-CD3A-4EA0-AAA4-0E00E896454E}">
-  <ds:schemaRefs>
-    <ds:schemaRef ds:uri="http://schemas.microsoft.com/sharepoint/v3/contenttype/forms"/>
-  </ds:schemaRefs>
-</ds:datastoreItem>
-</file>
-
-<file path=customXml/itemProps2.xml><?xml version="1.0" encoding="utf-8"?>
 <ds:datastoreItem xmlns:ds="http://schemas.openxmlformats.org/officeDocument/2006/customXml" ds:itemID="{B9E4DC25-62AA-44A0-8D5C-DB44892588AF}">
   <ds:schemaRefs>
     <ds:schemaRef ds:uri="http://schemas.microsoft.com/office/2006/metadata/contentType"/>
@@ -11600,6 +10754,14 @@
     <ds:schemaRef ds:uri="http://purl.org/dc/elements/1.1/"/>
     <ds:schemaRef ds:uri="http://purl.org/dc/terms/"/>
     <ds:schemaRef ds:uri="http://schemas.microsoft.com/internal/obd"/>
+  </ds:schemaRefs>
+</ds:datastoreItem>
+</file>
+
+<file path=customXml/itemProps2.xml><?xml version="1.0" encoding="utf-8"?>
+<ds:datastoreItem xmlns:ds="http://schemas.openxmlformats.org/officeDocument/2006/customXml" ds:itemID="{D546C03B-CD3A-4EA0-AAA4-0E00E896454E}">
+  <ds:schemaRefs>
+    <ds:schemaRef ds:uri="http://schemas.microsoft.com/sharepoint/v3/contenttype/forms"/>
   </ds:schemaRefs>
 </ds:datastoreItem>
 </file>

</xml_diff>